<commit_message>
Update Information-Retrieval Wikipedia Search Engine Project.pptx
</commit_message>
<xml_diff>
--- a/Administration/Information-Retrieval Wikipedia Search Engine Project.pptx
+++ b/Administration/Information-Retrieval Wikipedia Search Engine Project.pptx
@@ -5,14 +5,17 @@
     <p:sldMasterId id="2147483660" r:id="rId1"/>
   </p:sldMasterIdLst>
   <p:notesMasterIdLst>
-    <p:notesMasterId r:id="rId7"/>
+    <p:notesMasterId r:id="rId10"/>
   </p:notesMasterIdLst>
   <p:sldIdLst>
     <p:sldId id="256" r:id="rId2"/>
     <p:sldId id="257" r:id="rId3"/>
-    <p:sldId id="258" r:id="rId4"/>
-    <p:sldId id="259" r:id="rId5"/>
-    <p:sldId id="260" r:id="rId6"/>
+    <p:sldId id="261" r:id="rId4"/>
+    <p:sldId id="263" r:id="rId5"/>
+    <p:sldId id="262" r:id="rId6"/>
+    <p:sldId id="258" r:id="rId7"/>
+    <p:sldId id="259" r:id="rId8"/>
+    <p:sldId id="260" r:id="rId9"/>
   </p:sldIdLst>
   <p:sldSz cx="12192000" cy="6858000"/>
   <p:notesSz cx="6858000" cy="9144000"/>
@@ -201,7 +204,7 @@
           <a:p>
             <a:fld id="{EF979CB7-CC80-44D5-BFD4-B5F945161365}" type="datetimeFigureOut">
               <a:rPr lang="LID4096" smtClean="0"/>
-              <a:t>03/11/2024</a:t>
+              <a:t>12/16/2024</a:t>
             </a:fld>
             <a:endParaRPr lang="LID4096"/>
           </a:p>
@@ -804,7 +807,7 @@
           <a:p>
             <a:fld id="{A6933BEE-9900-4A69-BCE0-F11194D26DC8}" type="datetime1">
               <a:rPr lang="LID4096" smtClean="0"/>
-              <a:t>03/11/2024</a:t>
+              <a:t>12/16/2024</a:t>
             </a:fld>
             <a:endParaRPr lang="en-IL"/>
           </a:p>
@@ -1892,7 +1895,7 @@
           <a:p>
             <a:fld id="{9F734818-27E5-4E3C-9733-7FAB6EED5148}" type="datetime1">
               <a:rPr lang="LID4096" smtClean="0"/>
-              <a:t>03/11/2024</a:t>
+              <a:t>12/16/2024</a:t>
             </a:fld>
             <a:endParaRPr lang="en-IL"/>
           </a:p>
@@ -2872,7 +2875,7 @@
           <a:p>
             <a:fld id="{0E241A05-565C-4660-8777-45BACC1D5524}" type="datetime1">
               <a:rPr lang="LID4096" smtClean="0"/>
-              <a:t>03/11/2024</a:t>
+              <a:t>12/16/2024</a:t>
             </a:fld>
             <a:endParaRPr lang="en-IL"/>
           </a:p>
@@ -4006,7 +4009,7 @@
           <a:p>
             <a:fld id="{153711E1-0DBD-4C51-95F5-1DC7458719BB}" type="datetime1">
               <a:rPr lang="LID4096" smtClean="0"/>
-              <a:t>03/11/2024</a:t>
+              <a:t>12/16/2024</a:t>
             </a:fld>
             <a:endParaRPr lang="en-IL"/>
           </a:p>
@@ -5039,7 +5042,7 @@
           <a:p>
             <a:fld id="{BD2318D7-5096-4657-82BA-951B4677DE55}" type="datetime1">
               <a:rPr lang="LID4096" smtClean="0"/>
-              <a:t>03/11/2024</a:t>
+              <a:t>12/16/2024</a:t>
             </a:fld>
             <a:endParaRPr lang="en-IL"/>
           </a:p>
@@ -5699,7 +5702,7 @@
           <a:p>
             <a:fld id="{9880A675-1486-4F2F-9035-2A051B389BB2}" type="datetime1">
               <a:rPr lang="LID4096" smtClean="0"/>
-              <a:t>03/11/2024</a:t>
+              <a:t>12/16/2024</a:t>
             </a:fld>
             <a:endParaRPr lang="en-IL"/>
           </a:p>
@@ -6560,7 +6563,7 @@
           <a:p>
             <a:fld id="{14C895A6-6ABC-4AB4-924D-93D132CB4C28}" type="datetime1">
               <a:rPr lang="LID4096" smtClean="0"/>
-              <a:t>03/11/2024</a:t>
+              <a:t>12/16/2024</a:t>
             </a:fld>
             <a:endParaRPr lang="en-IL"/>
           </a:p>
@@ -6750,7 +6753,7 @@
           <a:p>
             <a:fld id="{490F6533-E8BF-452A-998D-B12400A690CD}" type="datetime1">
               <a:rPr lang="LID4096" smtClean="0"/>
-              <a:t>03/11/2024</a:t>
+              <a:t>12/16/2024</a:t>
             </a:fld>
             <a:endParaRPr lang="en-IL"/>
           </a:p>
@@ -7722,7 +7725,7 @@
           <a:p>
             <a:fld id="{8BD9821F-BAFC-43E5-9692-A8060781A370}" type="datetime1">
               <a:rPr lang="LID4096" smtClean="0"/>
-              <a:t>03/11/2024</a:t>
+              <a:t>12/16/2024</a:t>
             </a:fld>
             <a:endParaRPr lang="en-IL"/>
           </a:p>
@@ -7933,7 +7936,7 @@
           <a:p>
             <a:fld id="{9C4345FC-EFAA-41FB-950D-093A9D3F694F}" type="datetime1">
               <a:rPr lang="LID4096" smtClean="0"/>
-              <a:t>03/11/2024</a:t>
+              <a:t>12/16/2024</a:t>
             </a:fld>
             <a:endParaRPr lang="en-IL"/>
           </a:p>
@@ -8967,7 +8970,7 @@
           <a:p>
             <a:fld id="{DB2B4C62-FC2C-4975-A4DE-7893FC995648}" type="datetime1">
               <a:rPr lang="LID4096" smtClean="0"/>
-              <a:t>03/11/2024</a:t>
+              <a:t>12/16/2024</a:t>
             </a:fld>
             <a:endParaRPr lang="en-IL"/>
           </a:p>
@@ -9239,7 +9242,7 @@
           <a:p>
             <a:fld id="{4B61201B-CBA4-4714-8ECE-C5C6D8439953}" type="datetime1">
               <a:rPr lang="LID4096" smtClean="0"/>
-              <a:t>03/11/2024</a:t>
+              <a:t>12/16/2024</a:t>
             </a:fld>
             <a:endParaRPr lang="en-IL"/>
           </a:p>
@@ -9649,7 +9652,7 @@
           <a:p>
             <a:fld id="{3C9D501B-2268-46A7-96C7-12DE59926506}" type="datetime1">
               <a:rPr lang="LID4096" smtClean="0"/>
-              <a:t>03/11/2024</a:t>
+              <a:t>12/16/2024</a:t>
             </a:fld>
             <a:endParaRPr lang="en-IL"/>
           </a:p>
@@ -9776,7 +9779,7 @@
           <a:p>
             <a:fld id="{7ADB8727-DA71-47EA-8F76-BC07F8CB119E}" type="datetime1">
               <a:rPr lang="LID4096" smtClean="0"/>
-              <a:t>03/11/2024</a:t>
+              <a:t>12/16/2024</a:t>
             </a:fld>
             <a:endParaRPr lang="en-IL"/>
           </a:p>
@@ -9871,7 +9874,7 @@
           <a:p>
             <a:fld id="{FBA1250F-8518-4ED4-BF6A-DEFA6A1E66C4}" type="datetime1">
               <a:rPr lang="LID4096" smtClean="0"/>
-              <a:t>03/11/2024</a:t>
+              <a:t>12/16/2024</a:t>
             </a:fld>
             <a:endParaRPr lang="en-IL"/>
           </a:p>
@@ -10952,7 +10955,7 @@
           <a:p>
             <a:fld id="{ED8BB3FB-44C3-4E0A-8DBA-1F3414298F9C}" type="datetime1">
               <a:rPr lang="LID4096" smtClean="0"/>
-              <a:t>03/11/2024</a:t>
+              <a:t>12/16/2024</a:t>
             </a:fld>
             <a:endParaRPr lang="en-IL"/>
           </a:p>
@@ -12060,7 +12063,7 @@
           <a:p>
             <a:fld id="{C1A56E5C-DCF2-4B59-B1E1-2E003DDFA5A6}" type="datetime1">
               <a:rPr lang="LID4096" smtClean="0"/>
-              <a:t>03/11/2024</a:t>
+              <a:t>12/16/2024</a:t>
             </a:fld>
             <a:endParaRPr lang="en-IL"/>
           </a:p>
@@ -13057,7 +13060,7 @@
           <a:p>
             <a:fld id="{0C400027-443C-484F-89AE-22FD06061052}" type="datetime1">
               <a:rPr lang="LID4096" smtClean="0"/>
-              <a:t>03/11/2024</a:t>
+              <a:t>12/16/2024</a:t>
             </a:fld>
             <a:endParaRPr lang="en-IL"/>
           </a:p>
@@ -13635,7 +13638,7 @@
         </p:nvSpPr>
         <p:spPr>
           <a:xfrm>
-            <a:off x="1091964" y="1451387"/>
+            <a:off x="1683171" y="1240967"/>
             <a:ext cx="8825658" cy="3344787"/>
           </a:xfrm>
         </p:spPr>
@@ -13662,7 +13665,46 @@
                   </a:extLst>
                 </a:hlinkClick>
               </a:rPr>
-              <a:t>Information-Retrieval Wikipedia Search Engine Project</a:t>
+              <a:t>Information-Retrieval </a:t>
+            </a:r>
+            <a:br>
+              <a:rPr lang="en-GB" b="1" dirty="0">
+                <a:effectLst>
+                  <a:outerShdw blurRad="38100" dist="38100" dir="2700000" algn="tl">
+                    <a:srgbClr val="000000">
+                      <a:alpha val="43137"/>
+                    </a:srgbClr>
+                  </a:outerShdw>
+                </a:effectLst>
+                <a:latin typeface="-apple-system"/>
+                <a:hlinkClick r:id="rId2">
+                  <a:extLst>
+                    <a:ext uri="{A12FA001-AC4F-418D-AE19-62706E023703}">
+                      <ahyp:hlinkClr xmlns:ahyp="http://schemas.microsoft.com/office/drawing/2018/hyperlinkcolor" val="tx"/>
+                    </a:ext>
+                  </a:extLst>
+                </a:hlinkClick>
+              </a:rPr>
+            </a:br>
+            <a:r>
+              <a:rPr lang="en-GB" b="1" i="0" dirty="0">
+                <a:effectLst>
+                  <a:outerShdw blurRad="38100" dist="38100" dir="2700000" algn="tl">
+                    <a:srgbClr val="000000">
+                      <a:alpha val="43137"/>
+                    </a:srgbClr>
+                  </a:outerShdw>
+                </a:effectLst>
+                <a:latin typeface="-apple-system"/>
+                <a:hlinkClick r:id="rId2">
+                  <a:extLst>
+                    <a:ext uri="{A12FA001-AC4F-418D-AE19-62706E023703}">
+                      <ahyp:hlinkClr xmlns:ahyp="http://schemas.microsoft.com/office/drawing/2018/hyperlinkcolor" val="tx"/>
+                    </a:ext>
+                  </a:extLst>
+                </a:hlinkClick>
+              </a:rPr>
+              <a:t>Search Engine Project</a:t>
             </a:r>
             <a:br>
               <a:rPr lang="en-GB" dirty="0"/>
@@ -13757,8 +13799,8 @@
         </p:blipFill>
         <p:spPr>
           <a:xfrm>
-            <a:off x="8318091" y="3803045"/>
-            <a:ext cx="3167316" cy="2372430"/>
+            <a:off x="8752489" y="4113313"/>
+            <a:ext cx="2867029" cy="2147505"/>
           </a:xfrm>
           <a:prstGeom prst="rect">
             <a:avLst/>
@@ -13861,7 +13903,7 @@
                   </a:outerShdw>
                 </a:effectLst>
               </a:rPr>
-              <a:t>Preprocessing:</a:t>
+              <a:t>Preprocessing 1:</a:t>
             </a:r>
             <a:endParaRPr lang="en-IL" dirty="0">
               <a:effectLst>
@@ -13889,8 +13931,490 @@
         </p:nvSpPr>
         <p:spPr>
           <a:xfrm>
-            <a:off x="1737263" y="2479904"/>
-            <a:ext cx="1288025" cy="3846342"/>
+            <a:off x="1875917" y="2859196"/>
+            <a:ext cx="1067722" cy="2484260"/>
+          </a:xfrm>
+          <a:prstGeom prst="rect">
+            <a:avLst/>
+          </a:prstGeom>
+          <a:ln w="28575"/>
+        </p:spPr>
+        <p:style>
+          <a:lnRef idx="2">
+            <a:schemeClr val="accent6"/>
+          </a:lnRef>
+          <a:fillRef idx="1">
+            <a:schemeClr val="lt1"/>
+          </a:fillRef>
+          <a:effectRef idx="0">
+            <a:schemeClr val="accent6"/>
+          </a:effectRef>
+          <a:fontRef idx="minor">
+            <a:schemeClr val="dk1"/>
+          </a:fontRef>
+        </p:style>
+        <p:txBody>
+          <a:bodyPr rtlCol="0" anchor="ctr"/>
+          <a:lstStyle/>
+          <a:p>
+            <a:pPr algn="ctr"/>
+            <a:r>
+              <a:rPr lang="en-US" sz="1400" dirty="0"/>
+              <a:t>Wikipedia dump files</a:t>
+            </a:r>
+            <a:endParaRPr lang="en-IL" sz="1400" dirty="0"/>
+          </a:p>
+        </p:txBody>
+      </p:sp>
+      <p:sp>
+        <p:nvSpPr>
+          <p:cNvPr id="3" name="Slide Number Placeholder 2">
+            <a:extLst>
+              <a:ext uri="{FF2B5EF4-FFF2-40B4-BE49-F238E27FC236}">
+                <a16:creationId xmlns:a16="http://schemas.microsoft.com/office/drawing/2014/main" id="{40F02E7F-4658-38C0-D24D-B5A26028BFCE}"/>
+              </a:ext>
+            </a:extLst>
+          </p:cNvPr>
+          <p:cNvSpPr>
+            <a:spLocks noGrp="1"/>
+          </p:cNvSpPr>
+          <p:nvPr>
+            <p:ph type="sldNum" sz="quarter" idx="12"/>
+          </p:nvPr>
+        </p:nvSpPr>
+        <p:spPr/>
+        <p:txBody>
+          <a:bodyPr/>
+          <a:lstStyle/>
+          <a:p>
+            <a:fld id="{B3772009-285A-4481-B009-1807655A1149}" type="slidenum">
+              <a:rPr lang="en-IL" smtClean="0"/>
+              <a:t>2</a:t>
+            </a:fld>
+            <a:endParaRPr lang="en-IL"/>
+          </a:p>
+        </p:txBody>
+      </p:sp>
+      <p:sp>
+        <p:nvSpPr>
+          <p:cNvPr id="5" name="Rectangle 4">
+            <a:extLst>
+              <a:ext uri="{FF2B5EF4-FFF2-40B4-BE49-F238E27FC236}">
+                <a16:creationId xmlns:a16="http://schemas.microsoft.com/office/drawing/2014/main" id="{911EEBF4-5E57-049D-819D-30538DE73AFD}"/>
+              </a:ext>
+            </a:extLst>
+          </p:cNvPr>
+          <p:cNvSpPr/>
+          <p:nvPr/>
+        </p:nvSpPr>
+        <p:spPr>
+          <a:xfrm>
+            <a:off x="4269113" y="2826640"/>
+            <a:ext cx="1138039" cy="2516816"/>
+          </a:xfrm>
+          <a:prstGeom prst="rect">
+            <a:avLst/>
+          </a:prstGeom>
+          <a:ln w="28575"/>
+        </p:spPr>
+        <p:style>
+          <a:lnRef idx="2">
+            <a:schemeClr val="accent6"/>
+          </a:lnRef>
+          <a:fillRef idx="1">
+            <a:schemeClr val="lt1"/>
+          </a:fillRef>
+          <a:effectRef idx="0">
+            <a:schemeClr val="accent6"/>
+          </a:effectRef>
+          <a:fontRef idx="minor">
+            <a:schemeClr val="dk1"/>
+          </a:fontRef>
+        </p:style>
+        <p:txBody>
+          <a:bodyPr rtlCol="0" anchor="ctr"/>
+          <a:lstStyle/>
+          <a:p>
+            <a:pPr algn="ctr"/>
+            <a:r>
+              <a:rPr lang="en-US" sz="1400" dirty="0"/>
+              <a:t>Google Cloud</a:t>
+            </a:r>
+            <a:endParaRPr lang="en-IL" sz="1400" dirty="0"/>
+          </a:p>
+        </p:txBody>
+      </p:sp>
+      <p:sp>
+        <p:nvSpPr>
+          <p:cNvPr id="10" name="Arrow: Right 9">
+            <a:extLst>
+              <a:ext uri="{FF2B5EF4-FFF2-40B4-BE49-F238E27FC236}">
+                <a16:creationId xmlns:a16="http://schemas.microsoft.com/office/drawing/2014/main" id="{540A670C-65B7-2EB9-3612-ED0342264E33}"/>
+              </a:ext>
+            </a:extLst>
+          </p:cNvPr>
+          <p:cNvSpPr/>
+          <p:nvPr/>
+        </p:nvSpPr>
+        <p:spPr>
+          <a:xfrm>
+            <a:off x="3091222" y="3927437"/>
+            <a:ext cx="1017482" cy="157611"/>
+          </a:xfrm>
+          <a:prstGeom prst="rightArrow">
+            <a:avLst/>
+          </a:prstGeom>
+          <a:solidFill>
+            <a:schemeClr val="accent1"/>
+          </a:solidFill>
+        </p:spPr>
+        <p:style>
+          <a:lnRef idx="2">
+            <a:schemeClr val="accent1">
+              <a:shade val="15000"/>
+            </a:schemeClr>
+          </a:lnRef>
+          <a:fillRef idx="1">
+            <a:schemeClr val="accent1"/>
+          </a:fillRef>
+          <a:effectRef idx="0">
+            <a:schemeClr val="accent1"/>
+          </a:effectRef>
+          <a:fontRef idx="minor">
+            <a:schemeClr val="lt1"/>
+          </a:fontRef>
+        </p:style>
+        <p:txBody>
+          <a:bodyPr rtlCol="0" anchor="ctr"/>
+          <a:lstStyle/>
+          <a:p>
+            <a:pPr algn="ctr"/>
+            <a:endParaRPr lang="en-IL" sz="1600" dirty="0"/>
+          </a:p>
+        </p:txBody>
+      </p:sp>
+      <p:sp>
+        <p:nvSpPr>
+          <p:cNvPr id="24" name="Rectangle 23">
+            <a:extLst>
+              <a:ext uri="{FF2B5EF4-FFF2-40B4-BE49-F238E27FC236}">
+                <a16:creationId xmlns:a16="http://schemas.microsoft.com/office/drawing/2014/main" id="{E8221848-B3DD-F695-C59B-CC199F0F9F8D}"/>
+              </a:ext>
+            </a:extLst>
+          </p:cNvPr>
+          <p:cNvSpPr/>
+          <p:nvPr/>
+        </p:nvSpPr>
+        <p:spPr>
+          <a:xfrm>
+            <a:off x="6519604" y="2821714"/>
+            <a:ext cx="3502220" cy="2516816"/>
+          </a:xfrm>
+          <a:prstGeom prst="rect">
+            <a:avLst/>
+          </a:prstGeom>
+          <a:ln w="28575"/>
+        </p:spPr>
+        <p:style>
+          <a:lnRef idx="2">
+            <a:schemeClr val="accent6"/>
+          </a:lnRef>
+          <a:fillRef idx="1">
+            <a:schemeClr val="lt1"/>
+          </a:fillRef>
+          <a:effectRef idx="0">
+            <a:schemeClr val="accent6"/>
+          </a:effectRef>
+          <a:fontRef idx="minor">
+            <a:schemeClr val="dk1"/>
+          </a:fontRef>
+        </p:style>
+        <p:txBody>
+          <a:bodyPr rtlCol="0" anchor="ctr"/>
+          <a:lstStyle/>
+          <a:p>
+            <a:pPr algn="ctr"/>
+            <a:r>
+              <a:rPr lang="en-US" sz="1400" dirty="0"/>
+              <a:t>Created multiple .bin files as words-to-</a:t>
+            </a:r>
+            <a:r>
+              <a:rPr lang="en-US" sz="1400" dirty="0" err="1"/>
+              <a:t>article_id</a:t>
+            </a:r>
+            <a:r>
+              <a:rPr lang="en-US" sz="1400" dirty="0"/>
+              <a:t> data structure</a:t>
+            </a:r>
+          </a:p>
+          <a:p>
+            <a:pPr algn="ctr"/>
+            <a:r>
+              <a:rPr lang="en-US" sz="1400" b="1" dirty="0"/>
+              <a:t>A.K.A Inverted index</a:t>
+            </a:r>
+          </a:p>
+          <a:p>
+            <a:pPr algn="ctr"/>
+            <a:endParaRPr lang="en-US" sz="1400" b="1" dirty="0"/>
+          </a:p>
+          <a:p>
+            <a:pPr algn="ctr"/>
+            <a:r>
+              <a:rPr lang="en-US" sz="1400" dirty="0"/>
+              <a:t>Then created .</a:t>
+            </a:r>
+            <a:r>
+              <a:rPr lang="en-US" sz="1400" dirty="0" err="1"/>
+              <a:t>pkl</a:t>
+            </a:r>
+            <a:r>
+              <a:rPr lang="en-US" sz="1400" dirty="0"/>
+              <a:t> file as word-to-</a:t>
+            </a:r>
+            <a:r>
+              <a:rPr lang="en-US" sz="1400" dirty="0" err="1"/>
+              <a:t>bin_file</a:t>
+            </a:r>
+            <a:r>
+              <a:rPr lang="en-US" sz="1400" dirty="0"/>
+              <a:t> data structure</a:t>
+            </a:r>
+          </a:p>
+          <a:p>
+            <a:pPr algn="ctr"/>
+            <a:endParaRPr lang="en-US" sz="1400" dirty="0"/>
+          </a:p>
+        </p:txBody>
+      </p:sp>
+      <p:sp>
+        <p:nvSpPr>
+          <p:cNvPr id="25" name="Arrow: Right 24">
+            <a:extLst>
+              <a:ext uri="{FF2B5EF4-FFF2-40B4-BE49-F238E27FC236}">
+                <a16:creationId xmlns:a16="http://schemas.microsoft.com/office/drawing/2014/main" id="{925EA298-5DBF-5D98-B22C-EF62AA37F1C9}"/>
+              </a:ext>
+            </a:extLst>
+          </p:cNvPr>
+          <p:cNvSpPr/>
+          <p:nvPr/>
+        </p:nvSpPr>
+        <p:spPr>
+          <a:xfrm>
+            <a:off x="5480305" y="3968827"/>
+            <a:ext cx="969263" cy="157611"/>
+          </a:xfrm>
+          <a:prstGeom prst="rightArrow">
+            <a:avLst/>
+          </a:prstGeom>
+          <a:solidFill>
+            <a:schemeClr val="accent1"/>
+          </a:solidFill>
+        </p:spPr>
+        <p:style>
+          <a:lnRef idx="2">
+            <a:schemeClr val="accent1">
+              <a:shade val="15000"/>
+            </a:schemeClr>
+          </a:lnRef>
+          <a:fillRef idx="1">
+            <a:schemeClr val="accent1"/>
+          </a:fillRef>
+          <a:effectRef idx="0">
+            <a:schemeClr val="accent1"/>
+          </a:effectRef>
+          <a:fontRef idx="minor">
+            <a:schemeClr val="lt1"/>
+          </a:fontRef>
+        </p:style>
+        <p:txBody>
+          <a:bodyPr rtlCol="0" anchor="ctr"/>
+          <a:lstStyle/>
+          <a:p>
+            <a:pPr algn="ctr"/>
+            <a:endParaRPr lang="en-IL" sz="1600" dirty="0"/>
+          </a:p>
+        </p:txBody>
+      </p:sp>
+      <p:sp>
+        <p:nvSpPr>
+          <p:cNvPr id="26" name="TextBox 25">
+            <a:extLst>
+              <a:ext uri="{FF2B5EF4-FFF2-40B4-BE49-F238E27FC236}">
+                <a16:creationId xmlns:a16="http://schemas.microsoft.com/office/drawing/2014/main" id="{287C6D24-9E09-FCDA-5428-888E3B2CD4F8}"/>
+              </a:ext>
+            </a:extLst>
+          </p:cNvPr>
+          <p:cNvSpPr txBox="1"/>
+          <p:nvPr/>
+        </p:nvSpPr>
+        <p:spPr>
+          <a:xfrm>
+            <a:off x="3013495" y="3691828"/>
+            <a:ext cx="1255618" cy="276999"/>
+          </a:xfrm>
+          <a:prstGeom prst="rect">
+            <a:avLst/>
+          </a:prstGeom>
+          <a:noFill/>
+        </p:spPr>
+        <p:txBody>
+          <a:bodyPr wrap="square" rtlCol="0">
+            <a:spAutoFit/>
+          </a:bodyPr>
+          <a:lstStyle/>
+          <a:p>
+            <a:r>
+              <a:rPr lang="en-US" sz="1200" dirty="0"/>
+              <a:t>Uploaded to </a:t>
+            </a:r>
+            <a:endParaRPr lang="LID4096" sz="1200" dirty="0"/>
+          </a:p>
+        </p:txBody>
+      </p:sp>
+      <p:sp>
+        <p:nvSpPr>
+          <p:cNvPr id="27" name="TextBox 26">
+            <a:extLst>
+              <a:ext uri="{FF2B5EF4-FFF2-40B4-BE49-F238E27FC236}">
+                <a16:creationId xmlns:a16="http://schemas.microsoft.com/office/drawing/2014/main" id="{C1B9C876-DBF7-0EDD-A97B-C3C6B82523FD}"/>
+              </a:ext>
+            </a:extLst>
+          </p:cNvPr>
+          <p:cNvSpPr txBox="1"/>
+          <p:nvPr/>
+        </p:nvSpPr>
+        <p:spPr>
+          <a:xfrm>
+            <a:off x="5337127" y="3751134"/>
+            <a:ext cx="1255618" cy="276999"/>
+          </a:xfrm>
+          <a:prstGeom prst="rect">
+            <a:avLst/>
+          </a:prstGeom>
+          <a:noFill/>
+        </p:spPr>
+        <p:txBody>
+          <a:bodyPr wrap="square" rtlCol="0">
+            <a:spAutoFit/>
+          </a:bodyPr>
+          <a:lstStyle/>
+          <a:p>
+            <a:r>
+              <a:rPr lang="en-US" sz="1200" dirty="0"/>
+              <a:t>Using </a:t>
+            </a:r>
+            <a:r>
+              <a:rPr lang="en-US" sz="1200" dirty="0" err="1"/>
+              <a:t>PySpark</a:t>
+            </a:r>
+            <a:endParaRPr lang="LID4096" sz="1200" dirty="0"/>
+          </a:p>
+        </p:txBody>
+      </p:sp>
+    </p:spTree>
+    <p:extLst>
+      <p:ext uri="{BB962C8B-B14F-4D97-AF65-F5344CB8AC3E}">
+        <p14:creationId xmlns:p14="http://schemas.microsoft.com/office/powerpoint/2010/main" val="731650896"/>
+      </p:ext>
+    </p:extLst>
+  </p:cSld>
+  <p:clrMapOvr>
+    <a:masterClrMapping/>
+  </p:clrMapOvr>
+</p:sld>
+</file>
+
+<file path=ppt/slides/slide3.xml><?xml version="1.0" encoding="utf-8"?>
+<p:sld xmlns:a="http://schemas.openxmlformats.org/drawingml/2006/main" xmlns:r="http://schemas.openxmlformats.org/officeDocument/2006/relationships" xmlns:p="http://schemas.openxmlformats.org/presentationml/2006/main">
+  <p:cSld>
+    <p:spTree>
+      <p:nvGrpSpPr>
+        <p:cNvPr id="1" name="">
+          <a:extLst>
+            <a:ext uri="{FF2B5EF4-FFF2-40B4-BE49-F238E27FC236}">
+              <a16:creationId xmlns:a16="http://schemas.microsoft.com/office/drawing/2014/main" id="{D9BAEA08-DD4C-17D4-913A-D047DFA7B03F}"/>
+            </a:ext>
+          </a:extLst>
+        </p:cNvPr>
+        <p:cNvGrpSpPr/>
+        <p:nvPr/>
+      </p:nvGrpSpPr>
+      <p:grpSpPr>
+        <a:xfrm>
+          <a:off x="0" y="0"/>
+          <a:ext cx="0" cy="0"/>
+          <a:chOff x="0" y="0"/>
+          <a:chExt cx="0" cy="0"/>
+        </a:xfrm>
+      </p:grpSpPr>
+      <p:sp>
+        <p:nvSpPr>
+          <p:cNvPr id="2" name="Title 1">
+            <a:extLst>
+              <a:ext uri="{FF2B5EF4-FFF2-40B4-BE49-F238E27FC236}">
+                <a16:creationId xmlns:a16="http://schemas.microsoft.com/office/drawing/2014/main" id="{E83A9EEE-2170-BD8E-D7FA-CF23682A2897}"/>
+              </a:ext>
+            </a:extLst>
+          </p:cNvPr>
+          <p:cNvSpPr>
+            <a:spLocks noGrp="1"/>
+          </p:cNvSpPr>
+          <p:nvPr>
+            <p:ph type="title"/>
+          </p:nvPr>
+        </p:nvSpPr>
+        <p:spPr>
+          <a:xfrm>
+            <a:off x="1322103" y="944170"/>
+            <a:ext cx="8761413" cy="706964"/>
+          </a:xfrm>
+        </p:spPr>
+        <p:txBody>
+          <a:bodyPr/>
+          <a:lstStyle/>
+          <a:p>
+            <a:pPr algn="ctr"/>
+            <a:r>
+              <a:rPr lang="en-US" dirty="0">
+                <a:effectLst>
+                  <a:outerShdw blurRad="38100" dist="38100" dir="2700000" algn="tl">
+                    <a:srgbClr val="000000">
+                      <a:alpha val="43137"/>
+                    </a:srgbClr>
+                  </a:outerShdw>
+                </a:effectLst>
+              </a:rPr>
+              <a:t>Preprocessing 2:</a:t>
+            </a:r>
+            <a:endParaRPr lang="en-IL" dirty="0">
+              <a:effectLst>
+                <a:outerShdw blurRad="38100" dist="38100" dir="2700000" algn="tl">
+                  <a:srgbClr val="000000">
+                    <a:alpha val="43137"/>
+                  </a:srgbClr>
+                </a:outerShdw>
+              </a:effectLst>
+            </a:endParaRPr>
+          </a:p>
+        </p:txBody>
+      </p:sp>
+      <p:sp>
+        <p:nvSpPr>
+          <p:cNvPr id="4" name="Rectangle 3">
+            <a:extLst>
+              <a:ext uri="{FF2B5EF4-FFF2-40B4-BE49-F238E27FC236}">
+                <a16:creationId xmlns:a16="http://schemas.microsoft.com/office/drawing/2014/main" id="{6AA48412-D3DD-30AF-B632-9CF2F2B6759C}"/>
+              </a:ext>
+            </a:extLst>
+          </p:cNvPr>
+          <p:cNvSpPr/>
+          <p:nvPr/>
+        </p:nvSpPr>
+        <p:spPr>
+          <a:xfrm>
+            <a:off x="1652049" y="2409882"/>
+            <a:ext cx="1000473" cy="3725824"/>
           </a:xfrm>
           <a:prstGeom prst="rect">
             <a:avLst/>
@@ -13916,10 +14440,10 @@
           <a:p>
             <a:pPr algn="ctr"/>
             <a:r>
-              <a:rPr lang="en-US" dirty="0"/>
-              <a:t>Corpus</a:t>
+              <a:rPr lang="en-US" sz="1400" dirty="0"/>
+              <a:t>Google Cloud</a:t>
             </a:r>
-            <a:endParaRPr lang="en-IL" dirty="0"/>
+            <a:endParaRPr lang="en-IL" sz="1400" dirty="0"/>
           </a:p>
         </p:txBody>
       </p:sp>
@@ -13928,7 +14452,7 @@
           <p:cNvPr id="6" name="Arrow: Right 5">
             <a:extLst>
               <a:ext uri="{FF2B5EF4-FFF2-40B4-BE49-F238E27FC236}">
-                <a16:creationId xmlns:a16="http://schemas.microsoft.com/office/drawing/2014/main" id="{E8C5421D-E343-F3A4-8BC8-89243364E5BF}"/>
+                <a16:creationId xmlns:a16="http://schemas.microsoft.com/office/drawing/2014/main" id="{D714C95A-FE8A-2EC5-406F-DE99BA41616B}"/>
               </a:ext>
             </a:extLst>
           </p:cNvPr>
@@ -13937,7 +14461,7 @@
         </p:nvSpPr>
         <p:spPr>
           <a:xfrm>
-            <a:off x="3234814" y="2663225"/>
+            <a:off x="3074363" y="2676467"/>
             <a:ext cx="2510750" cy="630581"/>
           </a:xfrm>
           <a:prstGeom prst="rightArrow">
@@ -13969,10 +14493,10 @@
           <a:p>
             <a:pPr algn="ctr"/>
             <a:r>
-              <a:rPr lang="en-US" dirty="0"/>
+              <a:rPr lang="en-US" sz="1600" dirty="0"/>
               <a:t>Title</a:t>
             </a:r>
-            <a:endParaRPr lang="en-IL" dirty="0"/>
+            <a:endParaRPr lang="en-IL" sz="1600" dirty="0"/>
           </a:p>
         </p:txBody>
       </p:sp>
@@ -13981,7 +14505,7 @@
           <p:cNvPr id="8" name="Arrow: Right 7">
             <a:extLst>
               <a:ext uri="{FF2B5EF4-FFF2-40B4-BE49-F238E27FC236}">
-                <a16:creationId xmlns:a16="http://schemas.microsoft.com/office/drawing/2014/main" id="{23418741-CB5C-8D79-0AD1-708719A09B51}"/>
+                <a16:creationId xmlns:a16="http://schemas.microsoft.com/office/drawing/2014/main" id="{FB650BB2-FE3A-7C65-E3E8-D3C14C426870}"/>
               </a:ext>
             </a:extLst>
           </p:cNvPr>
@@ -13990,7 +14514,7 @@
         </p:nvSpPr>
         <p:spPr>
           <a:xfrm>
-            <a:off x="3275127" y="3796907"/>
+            <a:off x="3120928" y="3760331"/>
             <a:ext cx="2333218" cy="630581"/>
           </a:xfrm>
           <a:prstGeom prst="rightArrow">
@@ -14019,10 +14543,10 @@
           <a:p>
             <a:pPr algn="ctr"/>
             <a:r>
-              <a:rPr lang="en-US" dirty="0"/>
+              <a:rPr lang="en-US" sz="1600" dirty="0"/>
               <a:t>Doc Body</a:t>
             </a:r>
-            <a:endParaRPr lang="en-IL" dirty="0"/>
+            <a:endParaRPr lang="en-IL" sz="1600" dirty="0"/>
           </a:p>
         </p:txBody>
       </p:sp>
@@ -14031,7 +14555,7 @@
           <p:cNvPr id="9" name="Arrow: Right 8">
             <a:extLst>
               <a:ext uri="{FF2B5EF4-FFF2-40B4-BE49-F238E27FC236}">
-                <a16:creationId xmlns:a16="http://schemas.microsoft.com/office/drawing/2014/main" id="{1FEAD9E0-576B-CB19-F82B-81DECBDA1DD4}"/>
+                <a16:creationId xmlns:a16="http://schemas.microsoft.com/office/drawing/2014/main" id="{9BDB3AA6-B058-AB71-C09E-62F9CD1CC80A}"/>
               </a:ext>
             </a:extLst>
           </p:cNvPr>
@@ -14040,7 +14564,7 @@
         </p:nvSpPr>
         <p:spPr>
           <a:xfrm>
-            <a:off x="3275127" y="4846573"/>
+            <a:off x="3120928" y="4809997"/>
             <a:ext cx="2360846" cy="644709"/>
           </a:xfrm>
           <a:prstGeom prst="rightArrow">
@@ -14069,10 +14593,10 @@
           <a:p>
             <a:pPr algn="ctr"/>
             <a:r>
-              <a:rPr lang="en-US" sz="1400" dirty="0"/>
+              <a:rPr lang="en-US" sz="1200" dirty="0"/>
               <a:t>Anchor Text</a:t>
             </a:r>
-            <a:endParaRPr lang="en-IL" sz="1400" dirty="0"/>
+            <a:endParaRPr lang="en-IL" sz="1200" dirty="0"/>
           </a:p>
         </p:txBody>
       </p:sp>
@@ -14081,7 +14605,7 @@
           <p:cNvPr id="11" name="Rectangle 10">
             <a:extLst>
               <a:ext uri="{FF2B5EF4-FFF2-40B4-BE49-F238E27FC236}">
-                <a16:creationId xmlns:a16="http://schemas.microsoft.com/office/drawing/2014/main" id="{8FD702F6-60DC-4767-6B93-331F47CA6139}"/>
+                <a16:creationId xmlns:a16="http://schemas.microsoft.com/office/drawing/2014/main" id="{982D68F5-54B4-47D9-9B7B-F69064ECB5AF}"/>
               </a:ext>
             </a:extLst>
           </p:cNvPr>
@@ -14090,7 +14614,7 @@
         </p:nvSpPr>
         <p:spPr>
           <a:xfrm>
-            <a:off x="5745564" y="2613881"/>
+            <a:off x="5662626" y="2639345"/>
             <a:ext cx="1288025" cy="840932"/>
           </a:xfrm>
           <a:prstGeom prst="rect">
@@ -14117,22 +14641,22 @@
           <a:p>
             <a:pPr algn="ctr"/>
             <a:r>
-              <a:rPr lang="en-US" sz="1200" dirty="0"/>
+              <a:rPr lang="en-US" sz="1100" dirty="0"/>
               <a:t>Tokenize</a:t>
             </a:r>
             <a:r>
-              <a:rPr lang="en-US" dirty="0"/>
+              <a:rPr lang="en-US" sz="1600" dirty="0"/>
               <a:t>, </a:t>
             </a:r>
             <a:r>
-              <a:rPr lang="en-US" sz="1200" dirty="0" err="1"/>
+              <a:rPr lang="en-US" sz="1100" dirty="0" err="1"/>
               <a:t>Stopwords</a:t>
             </a:r>
             <a:r>
-              <a:rPr lang="en-US" sz="1200" dirty="0"/>
+              <a:rPr lang="en-US" sz="1100" dirty="0"/>
               <a:t> &amp; Stem</a:t>
             </a:r>
-            <a:endParaRPr lang="en-IL" dirty="0"/>
+            <a:endParaRPr lang="en-IL" sz="1600" dirty="0"/>
           </a:p>
         </p:txBody>
       </p:sp>
@@ -14141,7 +14665,7 @@
           <p:cNvPr id="12" name="Rectangle 11">
             <a:extLst>
               <a:ext uri="{FF2B5EF4-FFF2-40B4-BE49-F238E27FC236}">
-                <a16:creationId xmlns:a16="http://schemas.microsoft.com/office/drawing/2014/main" id="{71AF7A80-1B7B-8EDD-623C-1429CE927196}"/>
+                <a16:creationId xmlns:a16="http://schemas.microsoft.com/office/drawing/2014/main" id="{CDC00452-B3D6-F334-EC93-202A174976D9}"/>
               </a:ext>
             </a:extLst>
           </p:cNvPr>
@@ -14150,7 +14674,7 @@
         </p:nvSpPr>
         <p:spPr>
           <a:xfrm>
-            <a:off x="5796285" y="3746448"/>
+            <a:off x="5662627" y="3733071"/>
             <a:ext cx="1288025" cy="840932"/>
           </a:xfrm>
           <a:prstGeom prst="rect">
@@ -14177,22 +14701,22 @@
           <a:p>
             <a:pPr algn="ctr"/>
             <a:r>
-              <a:rPr lang="en-US" sz="1200" dirty="0"/>
+              <a:rPr lang="en-US" sz="1100" dirty="0"/>
               <a:t>Tokenize</a:t>
             </a:r>
             <a:r>
-              <a:rPr lang="en-US" dirty="0"/>
+              <a:rPr lang="en-US" sz="1600" dirty="0"/>
               <a:t>, </a:t>
             </a:r>
             <a:r>
-              <a:rPr lang="en-US" sz="1200" dirty="0" err="1"/>
+              <a:rPr lang="en-US" sz="1100" dirty="0" err="1"/>
               <a:t>Stopwords</a:t>
             </a:r>
             <a:r>
-              <a:rPr lang="en-US" sz="1200" dirty="0"/>
+              <a:rPr lang="en-US" sz="1100" dirty="0"/>
               <a:t> &amp; Stem</a:t>
             </a:r>
-            <a:endParaRPr lang="en-IL" dirty="0"/>
+            <a:endParaRPr lang="en-IL" sz="1600" dirty="0"/>
           </a:p>
         </p:txBody>
       </p:sp>
@@ -14201,7 +14725,7 @@
           <p:cNvPr id="13" name="Rectangle 12">
             <a:extLst>
               <a:ext uri="{FF2B5EF4-FFF2-40B4-BE49-F238E27FC236}">
-                <a16:creationId xmlns:a16="http://schemas.microsoft.com/office/drawing/2014/main" id="{67BF2FBB-E403-9318-208B-2310819B37AC}"/>
+                <a16:creationId xmlns:a16="http://schemas.microsoft.com/office/drawing/2014/main" id="{CE752352-0587-4EF9-0A58-0101F113FA9D}"/>
               </a:ext>
             </a:extLst>
           </p:cNvPr>
@@ -14210,7 +14734,7 @@
         </p:nvSpPr>
         <p:spPr>
           <a:xfrm>
-            <a:off x="5817410" y="4846573"/>
+            <a:off x="5663211" y="4809997"/>
             <a:ext cx="1288025" cy="840932"/>
           </a:xfrm>
           <a:prstGeom prst="rect">
@@ -14237,19 +14761,19 @@
           <a:p>
             <a:pPr algn="ctr"/>
             <a:r>
-              <a:rPr lang="en-US" sz="1200" dirty="0"/>
+              <a:rPr lang="en-US" sz="1100" dirty="0"/>
               <a:t>Page Rank Dictionary</a:t>
             </a:r>
-            <a:endParaRPr lang="en-IL" dirty="0"/>
+            <a:endParaRPr lang="en-IL" sz="1600" dirty="0"/>
           </a:p>
         </p:txBody>
       </p:sp>
       <p:sp>
         <p:nvSpPr>
-          <p:cNvPr id="14" name="Arrow: Right 13">
+          <p:cNvPr id="15" name="Rectangle 14">
             <a:extLst>
               <a:ext uri="{FF2B5EF4-FFF2-40B4-BE49-F238E27FC236}">
-                <a16:creationId xmlns:a16="http://schemas.microsoft.com/office/drawing/2014/main" id="{48DB086A-E0A3-5AD5-4E99-CF49E0EC31B0}"/>
+                <a16:creationId xmlns:a16="http://schemas.microsoft.com/office/drawing/2014/main" id="{F6F3595D-622F-C928-8372-1833F07EC4AB}"/>
               </a:ext>
             </a:extLst>
           </p:cNvPr>
@@ -14258,57 +14782,8 @@
         </p:nvSpPr>
         <p:spPr>
           <a:xfrm>
-            <a:off x="7272250" y="4087925"/>
-            <a:ext cx="1144203" cy="345355"/>
-          </a:xfrm>
-          <a:prstGeom prst="rightArrow">
-            <a:avLst/>
-          </a:prstGeom>
-          <a:solidFill>
-            <a:schemeClr val="accent1"/>
-          </a:solidFill>
-        </p:spPr>
-        <p:style>
-          <a:lnRef idx="2">
-            <a:schemeClr val="accent1">
-              <a:shade val="15000"/>
-            </a:schemeClr>
-          </a:lnRef>
-          <a:fillRef idx="1">
-            <a:schemeClr val="accent1"/>
-          </a:fillRef>
-          <a:effectRef idx="0">
-            <a:schemeClr val="accent1"/>
-          </a:effectRef>
-          <a:fontRef idx="minor">
-            <a:schemeClr val="lt1"/>
-          </a:fontRef>
-        </p:style>
-        <p:txBody>
-          <a:bodyPr rtlCol="0" anchor="ctr"/>
-          <a:lstStyle/>
-          <a:p>
-            <a:pPr algn="ctr"/>
-            <a:endParaRPr lang="en-IL" dirty="0"/>
-          </a:p>
-        </p:txBody>
-      </p:sp>
-      <p:sp>
-        <p:nvSpPr>
-          <p:cNvPr id="15" name="Rectangle 14">
-            <a:extLst>
-              <a:ext uri="{FF2B5EF4-FFF2-40B4-BE49-F238E27FC236}">
-                <a16:creationId xmlns:a16="http://schemas.microsoft.com/office/drawing/2014/main" id="{028A320F-63DA-3BBE-5777-1ABFA762FC79}"/>
-              </a:ext>
-            </a:extLst>
-          </p:cNvPr>
-          <p:cNvSpPr/>
-          <p:nvPr/>
-        </p:nvSpPr>
-        <p:spPr>
-          <a:xfrm>
-            <a:off x="8573729" y="2504577"/>
-            <a:ext cx="1828703" cy="1292330"/>
+            <a:off x="8429653" y="2345592"/>
+            <a:ext cx="1922887" cy="1134685"/>
           </a:xfrm>
           <a:prstGeom prst="rect">
             <a:avLst/>
@@ -14334,19 +14809,19 @@
           <a:p>
             <a:pPr algn="ctr"/>
             <a:r>
-              <a:rPr lang="en-US" sz="1200" dirty="0"/>
+              <a:rPr lang="en-US" sz="1100" dirty="0"/>
               <a:t>Inverted Index, Title length Dictionary and Doc id to Title Dictionary</a:t>
             </a:r>
-            <a:endParaRPr lang="en-IL" sz="1200" dirty="0"/>
+            <a:endParaRPr lang="en-IL" sz="1100" dirty="0"/>
           </a:p>
         </p:txBody>
       </p:sp>
       <p:sp>
         <p:nvSpPr>
-          <p:cNvPr id="16" name="Rectangle 15">
+          <p:cNvPr id="19" name="Arrow: Right 18">
             <a:extLst>
               <a:ext uri="{FF2B5EF4-FFF2-40B4-BE49-F238E27FC236}">
-                <a16:creationId xmlns:a16="http://schemas.microsoft.com/office/drawing/2014/main" id="{7C7DD638-915F-FBE1-6521-278DEE970B22}"/>
+                <a16:creationId xmlns:a16="http://schemas.microsoft.com/office/drawing/2014/main" id="{97FB3829-AA44-BEAD-3646-59462F25DDD3}"/>
               </a:ext>
             </a:extLst>
           </p:cNvPr>
@@ -14355,104 +14830,7 @@
         </p:nvSpPr>
         <p:spPr>
           <a:xfrm>
-            <a:off x="8573729" y="3956626"/>
-            <a:ext cx="1845568" cy="1192399"/>
-          </a:xfrm>
-          <a:prstGeom prst="rect">
-            <a:avLst/>
-          </a:prstGeom>
-        </p:spPr>
-        <p:style>
-          <a:lnRef idx="2">
-            <a:schemeClr val="accent6"/>
-          </a:lnRef>
-          <a:fillRef idx="1">
-            <a:schemeClr val="lt1"/>
-          </a:fillRef>
-          <a:effectRef idx="0">
-            <a:schemeClr val="accent6"/>
-          </a:effectRef>
-          <a:fontRef idx="minor">
-            <a:schemeClr val="dk1"/>
-          </a:fontRef>
-        </p:style>
-        <p:txBody>
-          <a:bodyPr rtlCol="0" anchor="ctr"/>
-          <a:lstStyle/>
-          <a:p>
-            <a:pPr algn="ctr"/>
-            <a:r>
-              <a:rPr lang="en-US" sz="1200" dirty="0"/>
-              <a:t>Inverted Index, Doc L2 Norm Dictionary and Body Length Dictionary</a:t>
-            </a:r>
-            <a:endParaRPr lang="en-IL" sz="1200" dirty="0"/>
-          </a:p>
-        </p:txBody>
-      </p:sp>
-      <p:sp>
-        <p:nvSpPr>
-          <p:cNvPr id="17" name="Arrow: Right 16">
-            <a:extLst>
-              <a:ext uri="{FF2B5EF4-FFF2-40B4-BE49-F238E27FC236}">
-                <a16:creationId xmlns:a16="http://schemas.microsoft.com/office/drawing/2014/main" id="{D40073FB-D0DA-CC9D-65BE-292A6F8418DD}"/>
-              </a:ext>
-            </a:extLst>
-          </p:cNvPr>
-          <p:cNvSpPr/>
-          <p:nvPr/>
-        </p:nvSpPr>
-        <p:spPr>
-          <a:xfrm>
-            <a:off x="7377711" y="2855657"/>
-            <a:ext cx="1058798" cy="345355"/>
-          </a:xfrm>
-          <a:prstGeom prst="rightArrow">
-            <a:avLst/>
-          </a:prstGeom>
-          <a:solidFill>
-            <a:schemeClr val="accent1"/>
-          </a:solidFill>
-        </p:spPr>
-        <p:style>
-          <a:lnRef idx="2">
-            <a:schemeClr val="accent1">
-              <a:shade val="15000"/>
-            </a:schemeClr>
-          </a:lnRef>
-          <a:fillRef idx="1">
-            <a:schemeClr val="accent1"/>
-          </a:fillRef>
-          <a:effectRef idx="0">
-            <a:schemeClr val="accent1"/>
-          </a:effectRef>
-          <a:fontRef idx="minor">
-            <a:schemeClr val="lt1"/>
-          </a:fontRef>
-        </p:style>
-        <p:txBody>
-          <a:bodyPr rtlCol="0" anchor="ctr"/>
-          <a:lstStyle/>
-          <a:p>
-            <a:pPr algn="ctr"/>
-            <a:endParaRPr lang="en-IL" dirty="0"/>
-          </a:p>
-        </p:txBody>
-      </p:sp>
-      <p:sp>
-        <p:nvSpPr>
-          <p:cNvPr id="19" name="Arrow: Right 18">
-            <a:extLst>
-              <a:ext uri="{FF2B5EF4-FFF2-40B4-BE49-F238E27FC236}">
-                <a16:creationId xmlns:a16="http://schemas.microsoft.com/office/drawing/2014/main" id="{716ADB6E-CD3E-01D2-DC55-A189BA2CDC08}"/>
-              </a:ext>
-            </a:extLst>
-          </p:cNvPr>
-          <p:cNvSpPr/>
-          <p:nvPr/>
-        </p:nvSpPr>
-        <p:spPr>
-          <a:xfrm>
-            <a:off x="3275127" y="5796209"/>
+            <a:off x="3120928" y="5759633"/>
             <a:ext cx="5298602" cy="325921"/>
           </a:xfrm>
           <a:prstGeom prst="rightArrow">
@@ -14483,7 +14861,7 @@
           <a:lstStyle/>
           <a:p>
             <a:pPr algn="ctr"/>
-            <a:endParaRPr lang="en-IL" dirty="0"/>
+            <a:endParaRPr lang="en-IL" sz="1600" dirty="0"/>
           </a:p>
         </p:txBody>
       </p:sp>
@@ -14492,7 +14870,7 @@
           <p:cNvPr id="20" name="Rectangle 19">
             <a:extLst>
               <a:ext uri="{FF2B5EF4-FFF2-40B4-BE49-F238E27FC236}">
-                <a16:creationId xmlns:a16="http://schemas.microsoft.com/office/drawing/2014/main" id="{D08ED5FF-F27A-D89A-3353-6B74476AB98C}"/>
+                <a16:creationId xmlns:a16="http://schemas.microsoft.com/office/drawing/2014/main" id="{6B0C7D25-EDCA-030A-056F-B32A195A5666}"/>
               </a:ext>
             </a:extLst>
           </p:cNvPr>
@@ -14501,7 +14879,7 @@
         </p:nvSpPr>
         <p:spPr>
           <a:xfrm>
-            <a:off x="8663863" y="5493364"/>
+            <a:off x="8509664" y="5456788"/>
             <a:ext cx="1288025" cy="840932"/>
           </a:xfrm>
           <a:prstGeom prst="rect">
@@ -14528,10 +14906,10 @@
           <a:p>
             <a:pPr algn="ctr"/>
             <a:r>
-              <a:rPr lang="en-US" sz="1200" dirty="0"/>
+              <a:rPr lang="en-US" sz="1100" dirty="0"/>
               <a:t>Page View Dictionary</a:t>
             </a:r>
-            <a:endParaRPr lang="en-IL" dirty="0"/>
+            <a:endParaRPr lang="en-IL" sz="1600" dirty="0"/>
           </a:p>
         </p:txBody>
       </p:sp>
@@ -14540,7 +14918,7 @@
           <p:cNvPr id="3" name="Slide Number Placeholder 2">
             <a:extLst>
               <a:ext uri="{FF2B5EF4-FFF2-40B4-BE49-F238E27FC236}">
-                <a16:creationId xmlns:a16="http://schemas.microsoft.com/office/drawing/2014/main" id="{40F02E7F-4658-38C0-D24D-B5A26028BFCE}"/>
+                <a16:creationId xmlns:a16="http://schemas.microsoft.com/office/drawing/2014/main" id="{6895341A-9E7E-33B2-3A45-4D3612D505C2}"/>
               </a:ext>
             </a:extLst>
           </p:cNvPr>
@@ -14558,16 +14936,162 @@
           <a:p>
             <a:fld id="{B3772009-285A-4481-B009-1807655A1149}" type="slidenum">
               <a:rPr lang="en-IL" smtClean="0"/>
-              <a:t>2</a:t>
+              <a:t>3</a:t>
             </a:fld>
             <a:endParaRPr lang="en-IL"/>
+          </a:p>
+        </p:txBody>
+      </p:sp>
+      <p:sp>
+        <p:nvSpPr>
+          <p:cNvPr id="7" name="Arrow: Right 6">
+            <a:extLst>
+              <a:ext uri="{FF2B5EF4-FFF2-40B4-BE49-F238E27FC236}">
+                <a16:creationId xmlns:a16="http://schemas.microsoft.com/office/drawing/2014/main" id="{136CB4B4-C78C-D91F-65A4-1F8D9F12A92F}"/>
+              </a:ext>
+            </a:extLst>
+          </p:cNvPr>
+          <p:cNvSpPr/>
+          <p:nvPr/>
+        </p:nvSpPr>
+        <p:spPr>
+          <a:xfrm>
+            <a:off x="7118051" y="3059811"/>
+            <a:ext cx="1144202" cy="157611"/>
+          </a:xfrm>
+          <a:prstGeom prst="rightArrow">
+            <a:avLst/>
+          </a:prstGeom>
+          <a:solidFill>
+            <a:schemeClr val="accent1"/>
+          </a:solidFill>
+        </p:spPr>
+        <p:style>
+          <a:lnRef idx="2">
+            <a:schemeClr val="accent1">
+              <a:shade val="15000"/>
+            </a:schemeClr>
+          </a:lnRef>
+          <a:fillRef idx="1">
+            <a:schemeClr val="accent1"/>
+          </a:fillRef>
+          <a:effectRef idx="0">
+            <a:schemeClr val="accent1"/>
+          </a:effectRef>
+          <a:fontRef idx="minor">
+            <a:schemeClr val="lt1"/>
+          </a:fontRef>
+        </p:style>
+        <p:txBody>
+          <a:bodyPr rtlCol="0" anchor="ctr"/>
+          <a:lstStyle/>
+          <a:p>
+            <a:pPr algn="ctr"/>
+            <a:endParaRPr lang="en-IL" sz="1600" dirty="0"/>
+          </a:p>
+        </p:txBody>
+      </p:sp>
+      <p:sp>
+        <p:nvSpPr>
+          <p:cNvPr id="18" name="Arrow: Right 17">
+            <a:extLst>
+              <a:ext uri="{FF2B5EF4-FFF2-40B4-BE49-F238E27FC236}">
+                <a16:creationId xmlns:a16="http://schemas.microsoft.com/office/drawing/2014/main" id="{01DE2D53-4473-1972-8B29-FAF4BD7FDFBB}"/>
+              </a:ext>
+            </a:extLst>
+          </p:cNvPr>
+          <p:cNvSpPr/>
+          <p:nvPr/>
+        </p:nvSpPr>
+        <p:spPr>
+          <a:xfrm>
+            <a:off x="7118050" y="4115183"/>
+            <a:ext cx="1144202" cy="157611"/>
+          </a:xfrm>
+          <a:prstGeom prst="rightArrow">
+            <a:avLst/>
+          </a:prstGeom>
+          <a:solidFill>
+            <a:schemeClr val="accent1"/>
+          </a:solidFill>
+        </p:spPr>
+        <p:style>
+          <a:lnRef idx="2">
+            <a:schemeClr val="accent1">
+              <a:shade val="15000"/>
+            </a:schemeClr>
+          </a:lnRef>
+          <a:fillRef idx="1">
+            <a:schemeClr val="accent1"/>
+          </a:fillRef>
+          <a:effectRef idx="0">
+            <a:schemeClr val="accent1"/>
+          </a:effectRef>
+          <a:fontRef idx="minor">
+            <a:schemeClr val="lt1"/>
+          </a:fontRef>
+        </p:style>
+        <p:txBody>
+          <a:bodyPr rtlCol="0" anchor="ctr"/>
+          <a:lstStyle/>
+          <a:p>
+            <a:pPr algn="ctr"/>
+            <a:endParaRPr lang="en-IL" sz="1600" dirty="0"/>
+          </a:p>
+        </p:txBody>
+      </p:sp>
+      <p:sp>
+        <p:nvSpPr>
+          <p:cNvPr id="22" name="Rectangle 21">
+            <a:extLst>
+              <a:ext uri="{FF2B5EF4-FFF2-40B4-BE49-F238E27FC236}">
+                <a16:creationId xmlns:a16="http://schemas.microsoft.com/office/drawing/2014/main" id="{6B6544C2-7032-10A9-CD8B-95E42F8D0768}"/>
+              </a:ext>
+            </a:extLst>
+          </p:cNvPr>
+          <p:cNvSpPr/>
+          <p:nvPr/>
+        </p:nvSpPr>
+        <p:spPr>
+          <a:xfrm>
+            <a:off x="8429650" y="3675312"/>
+            <a:ext cx="1922887" cy="1134685"/>
+          </a:xfrm>
+          <a:prstGeom prst="rect">
+            <a:avLst/>
+          </a:prstGeom>
+        </p:spPr>
+        <p:style>
+          <a:lnRef idx="2">
+            <a:schemeClr val="accent6"/>
+          </a:lnRef>
+          <a:fillRef idx="1">
+            <a:schemeClr val="lt1"/>
+          </a:fillRef>
+          <a:effectRef idx="0">
+            <a:schemeClr val="accent6"/>
+          </a:effectRef>
+          <a:fontRef idx="minor">
+            <a:schemeClr val="dk1"/>
+          </a:fontRef>
+        </p:style>
+        <p:txBody>
+          <a:bodyPr rtlCol="0" anchor="ctr"/>
+          <a:lstStyle/>
+          <a:p>
+            <a:pPr algn="ctr"/>
+            <a:r>
+              <a:rPr lang="en-US" sz="1100" dirty="0"/>
+              <a:t>Inverted Index, Doc L2 Norm Dictionary and Body Length Dictionary</a:t>
+            </a:r>
+            <a:endParaRPr lang="en-IL" sz="1100" dirty="0"/>
           </a:p>
         </p:txBody>
       </p:sp>
     </p:spTree>
     <p:extLst>
       <p:ext uri="{BB962C8B-B14F-4D97-AF65-F5344CB8AC3E}">
-        <p14:creationId xmlns:p14="http://schemas.microsoft.com/office/powerpoint/2010/main" val="731650896"/>
+        <p14:creationId xmlns:p14="http://schemas.microsoft.com/office/powerpoint/2010/main" val="2878685834"/>
       </p:ext>
     </p:extLst>
   </p:cSld>
@@ -14577,7 +15101,1224 @@
 </p:sld>
 </file>
 
-<file path=ppt/slides/slide3.xml><?xml version="1.0" encoding="utf-8"?>
+<file path=ppt/slides/slide4.xml><?xml version="1.0" encoding="utf-8"?>
+<p:sld xmlns:a="http://schemas.openxmlformats.org/drawingml/2006/main" xmlns:r="http://schemas.openxmlformats.org/officeDocument/2006/relationships" xmlns:p="http://schemas.openxmlformats.org/presentationml/2006/main">
+  <p:cSld>
+    <p:spTree>
+      <p:nvGrpSpPr>
+        <p:cNvPr id="1" name="">
+          <a:extLst>
+            <a:ext uri="{FF2B5EF4-FFF2-40B4-BE49-F238E27FC236}">
+              <a16:creationId xmlns:a16="http://schemas.microsoft.com/office/drawing/2014/main" id="{1C18577E-CFA8-2C1A-1E52-271CF1774730}"/>
+            </a:ext>
+          </a:extLst>
+        </p:cNvPr>
+        <p:cNvGrpSpPr/>
+        <p:nvPr/>
+      </p:nvGrpSpPr>
+      <p:grpSpPr>
+        <a:xfrm>
+          <a:off x="0" y="0"/>
+          <a:ext cx="0" cy="0"/>
+          <a:chOff x="0" y="0"/>
+          <a:chExt cx="0" cy="0"/>
+        </a:xfrm>
+      </p:grpSpPr>
+      <p:sp>
+        <p:nvSpPr>
+          <p:cNvPr id="2" name="Title 1">
+            <a:extLst>
+              <a:ext uri="{FF2B5EF4-FFF2-40B4-BE49-F238E27FC236}">
+                <a16:creationId xmlns:a16="http://schemas.microsoft.com/office/drawing/2014/main" id="{6A27E5E8-186A-EBE6-D401-910A02DB41A2}"/>
+              </a:ext>
+            </a:extLst>
+          </p:cNvPr>
+          <p:cNvSpPr>
+            <a:spLocks noGrp="1"/>
+          </p:cNvSpPr>
+          <p:nvPr>
+            <p:ph type="title"/>
+          </p:nvPr>
+        </p:nvSpPr>
+        <p:spPr>
+          <a:xfrm>
+            <a:off x="1322103" y="944170"/>
+            <a:ext cx="8761413" cy="706964"/>
+          </a:xfrm>
+        </p:spPr>
+        <p:txBody>
+          <a:bodyPr/>
+          <a:lstStyle/>
+          <a:p>
+            <a:pPr algn="ctr"/>
+            <a:r>
+              <a:rPr lang="en-US" dirty="0">
+                <a:effectLst>
+                  <a:outerShdw blurRad="38100" dist="38100" dir="2700000" algn="tl">
+                    <a:srgbClr val="000000">
+                      <a:alpha val="43137"/>
+                    </a:srgbClr>
+                  </a:outerShdw>
+                </a:effectLst>
+              </a:rPr>
+              <a:t>Preprocessing 3:</a:t>
+            </a:r>
+            <a:endParaRPr lang="en-IL" dirty="0">
+              <a:effectLst>
+                <a:outerShdw blurRad="38100" dist="38100" dir="2700000" algn="tl">
+                  <a:srgbClr val="000000">
+                    <a:alpha val="43137"/>
+                  </a:srgbClr>
+                </a:outerShdw>
+              </a:effectLst>
+            </a:endParaRPr>
+          </a:p>
+        </p:txBody>
+      </p:sp>
+      <p:sp>
+        <p:nvSpPr>
+          <p:cNvPr id="3" name="Slide Number Placeholder 2">
+            <a:extLst>
+              <a:ext uri="{FF2B5EF4-FFF2-40B4-BE49-F238E27FC236}">
+                <a16:creationId xmlns:a16="http://schemas.microsoft.com/office/drawing/2014/main" id="{EC4B7150-90B1-2967-6BEA-5AD86C42CB74}"/>
+              </a:ext>
+            </a:extLst>
+          </p:cNvPr>
+          <p:cNvSpPr>
+            <a:spLocks noGrp="1"/>
+          </p:cNvSpPr>
+          <p:nvPr>
+            <p:ph type="sldNum" sz="quarter" idx="12"/>
+          </p:nvPr>
+        </p:nvSpPr>
+        <p:spPr/>
+        <p:txBody>
+          <a:bodyPr/>
+          <a:lstStyle/>
+          <a:p>
+            <a:fld id="{B3772009-285A-4481-B009-1807655A1149}" type="slidenum">
+              <a:rPr lang="en-IL" smtClean="0"/>
+              <a:t>4</a:t>
+            </a:fld>
+            <a:endParaRPr lang="en-IL"/>
+          </a:p>
+        </p:txBody>
+      </p:sp>
+      <p:sp>
+        <p:nvSpPr>
+          <p:cNvPr id="5" name="Rectangle 4">
+            <a:extLst>
+              <a:ext uri="{FF2B5EF4-FFF2-40B4-BE49-F238E27FC236}">
+                <a16:creationId xmlns:a16="http://schemas.microsoft.com/office/drawing/2014/main" id="{A4C3F94C-C183-E7A3-4669-91E423268562}"/>
+              </a:ext>
+            </a:extLst>
+          </p:cNvPr>
+          <p:cNvSpPr/>
+          <p:nvPr/>
+        </p:nvSpPr>
+        <p:spPr>
+          <a:xfrm>
+            <a:off x="5301751" y="2477346"/>
+            <a:ext cx="1288025" cy="3725824"/>
+          </a:xfrm>
+          <a:prstGeom prst="rect">
+            <a:avLst/>
+          </a:prstGeom>
+        </p:spPr>
+        <p:style>
+          <a:lnRef idx="2">
+            <a:schemeClr val="accent6"/>
+          </a:lnRef>
+          <a:fillRef idx="1">
+            <a:schemeClr val="lt1"/>
+          </a:fillRef>
+          <a:effectRef idx="0">
+            <a:schemeClr val="accent6"/>
+          </a:effectRef>
+          <a:fontRef idx="minor">
+            <a:schemeClr val="dk1"/>
+          </a:fontRef>
+        </p:style>
+        <p:txBody>
+          <a:bodyPr rtlCol="0" anchor="ctr"/>
+          <a:lstStyle/>
+          <a:p>
+            <a:pPr algn="ctr"/>
+            <a:r>
+              <a:rPr lang="en-US" sz="1400" dirty="0"/>
+              <a:t>Loads all .</a:t>
+            </a:r>
+            <a:r>
+              <a:rPr lang="en-US" sz="1400" dirty="0" err="1"/>
+              <a:t>pkl</a:t>
+            </a:r>
+            <a:r>
+              <a:rPr lang="en-US" sz="1400" dirty="0"/>
+              <a:t> files from the google cloud</a:t>
+            </a:r>
+          </a:p>
+          <a:p>
+            <a:pPr algn="ctr"/>
+            <a:r>
+              <a:rPr lang="en-US" sz="1400" dirty="0"/>
+              <a:t>bucket</a:t>
+            </a:r>
+            <a:endParaRPr lang="en-IL" sz="1400" dirty="0"/>
+          </a:p>
+        </p:txBody>
+      </p:sp>
+      <p:sp>
+        <p:nvSpPr>
+          <p:cNvPr id="10" name="Arrow: Right 9">
+            <a:extLst>
+              <a:ext uri="{FF2B5EF4-FFF2-40B4-BE49-F238E27FC236}">
+                <a16:creationId xmlns:a16="http://schemas.microsoft.com/office/drawing/2014/main" id="{81B4CFD2-364A-86F0-938A-3ED863B2435A}"/>
+              </a:ext>
+            </a:extLst>
+          </p:cNvPr>
+          <p:cNvSpPr/>
+          <p:nvPr/>
+        </p:nvSpPr>
+        <p:spPr>
+          <a:xfrm>
+            <a:off x="3996964" y="4261452"/>
+            <a:ext cx="1144202" cy="157611"/>
+          </a:xfrm>
+          <a:prstGeom prst="rightArrow">
+            <a:avLst/>
+          </a:prstGeom>
+          <a:solidFill>
+            <a:schemeClr val="accent1"/>
+          </a:solidFill>
+        </p:spPr>
+        <p:style>
+          <a:lnRef idx="2">
+            <a:schemeClr val="accent1">
+              <a:shade val="15000"/>
+            </a:schemeClr>
+          </a:lnRef>
+          <a:fillRef idx="1">
+            <a:schemeClr val="accent1"/>
+          </a:fillRef>
+          <a:effectRef idx="0">
+            <a:schemeClr val="accent1"/>
+          </a:effectRef>
+          <a:fontRef idx="minor">
+            <a:schemeClr val="lt1"/>
+          </a:fontRef>
+        </p:style>
+        <p:txBody>
+          <a:bodyPr rtlCol="0" anchor="ctr"/>
+          <a:lstStyle/>
+          <a:p>
+            <a:pPr algn="ctr"/>
+            <a:endParaRPr lang="en-IL" sz="1600" dirty="0"/>
+          </a:p>
+        </p:txBody>
+      </p:sp>
+      <p:sp>
+        <p:nvSpPr>
+          <p:cNvPr id="21" name="Rectangle 20">
+            <a:extLst>
+              <a:ext uri="{FF2B5EF4-FFF2-40B4-BE49-F238E27FC236}">
+                <a16:creationId xmlns:a16="http://schemas.microsoft.com/office/drawing/2014/main" id="{AD7C0693-8470-33C6-06D2-657874B5BB83}"/>
+              </a:ext>
+            </a:extLst>
+          </p:cNvPr>
+          <p:cNvSpPr/>
+          <p:nvPr/>
+        </p:nvSpPr>
+        <p:spPr>
+          <a:xfrm>
+            <a:off x="2548354" y="2477345"/>
+            <a:ext cx="1288025" cy="3725824"/>
+          </a:xfrm>
+          <a:prstGeom prst="rect">
+            <a:avLst/>
+          </a:prstGeom>
+        </p:spPr>
+        <p:style>
+          <a:lnRef idx="2">
+            <a:schemeClr val="accent6"/>
+          </a:lnRef>
+          <a:fillRef idx="1">
+            <a:schemeClr val="lt1"/>
+          </a:fillRef>
+          <a:effectRef idx="0">
+            <a:schemeClr val="accent6"/>
+          </a:effectRef>
+          <a:fontRef idx="minor">
+            <a:schemeClr val="dk1"/>
+          </a:fontRef>
+        </p:style>
+        <p:txBody>
+          <a:bodyPr rtlCol="0" anchor="ctr"/>
+          <a:lstStyle/>
+          <a:p>
+            <a:pPr algn="ctr"/>
+            <a:r>
+              <a:rPr lang="en-US" sz="1400" dirty="0"/>
+              <a:t>Running Python server using Flask on google cloud cluster</a:t>
+            </a:r>
+            <a:endParaRPr lang="en-IL" sz="1400" dirty="0"/>
+          </a:p>
+        </p:txBody>
+      </p:sp>
+      <p:sp>
+        <p:nvSpPr>
+          <p:cNvPr id="22" name="Rectangle 21">
+            <a:extLst>
+              <a:ext uri="{FF2B5EF4-FFF2-40B4-BE49-F238E27FC236}">
+                <a16:creationId xmlns:a16="http://schemas.microsoft.com/office/drawing/2014/main" id="{366A4A36-2553-2FE4-8F34-B00FB596EF5B}"/>
+              </a:ext>
+            </a:extLst>
+          </p:cNvPr>
+          <p:cNvSpPr/>
+          <p:nvPr/>
+        </p:nvSpPr>
+        <p:spPr>
+          <a:xfrm>
+            <a:off x="7876258" y="2477345"/>
+            <a:ext cx="1288025" cy="3725824"/>
+          </a:xfrm>
+          <a:prstGeom prst="rect">
+            <a:avLst/>
+          </a:prstGeom>
+        </p:spPr>
+        <p:style>
+          <a:lnRef idx="2">
+            <a:schemeClr val="accent6"/>
+          </a:lnRef>
+          <a:fillRef idx="1">
+            <a:schemeClr val="lt1"/>
+          </a:fillRef>
+          <a:effectRef idx="0">
+            <a:schemeClr val="accent6"/>
+          </a:effectRef>
+          <a:fontRef idx="minor">
+            <a:schemeClr val="dk1"/>
+          </a:fontRef>
+        </p:style>
+        <p:txBody>
+          <a:bodyPr rtlCol="0" anchor="ctr"/>
+          <a:lstStyle/>
+          <a:p>
+            <a:pPr algn="ctr"/>
+            <a:r>
+              <a:rPr lang="en-US" sz="1400" dirty="0"/>
+              <a:t>Waits for user input</a:t>
+            </a:r>
+            <a:endParaRPr lang="en-IL" sz="1400" dirty="0"/>
+          </a:p>
+        </p:txBody>
+      </p:sp>
+      <p:sp>
+        <p:nvSpPr>
+          <p:cNvPr id="23" name="Arrow: Right 22">
+            <a:extLst>
+              <a:ext uri="{FF2B5EF4-FFF2-40B4-BE49-F238E27FC236}">
+                <a16:creationId xmlns:a16="http://schemas.microsoft.com/office/drawing/2014/main" id="{9C2B9B3A-99DC-5C4C-0037-33A47405A679}"/>
+              </a:ext>
+            </a:extLst>
+          </p:cNvPr>
+          <p:cNvSpPr/>
+          <p:nvPr/>
+        </p:nvSpPr>
+        <p:spPr>
+          <a:xfrm>
+            <a:off x="6660916" y="4261452"/>
+            <a:ext cx="1144202" cy="157611"/>
+          </a:xfrm>
+          <a:prstGeom prst="rightArrow">
+            <a:avLst/>
+          </a:prstGeom>
+          <a:solidFill>
+            <a:schemeClr val="accent1"/>
+          </a:solidFill>
+        </p:spPr>
+        <p:style>
+          <a:lnRef idx="2">
+            <a:schemeClr val="accent1">
+              <a:shade val="15000"/>
+            </a:schemeClr>
+          </a:lnRef>
+          <a:fillRef idx="1">
+            <a:schemeClr val="accent1"/>
+          </a:fillRef>
+          <a:effectRef idx="0">
+            <a:schemeClr val="accent1"/>
+          </a:effectRef>
+          <a:fontRef idx="minor">
+            <a:schemeClr val="lt1"/>
+          </a:fontRef>
+        </p:style>
+        <p:txBody>
+          <a:bodyPr rtlCol="0" anchor="ctr"/>
+          <a:lstStyle/>
+          <a:p>
+            <a:pPr algn="ctr"/>
+            <a:endParaRPr lang="en-IL" sz="1600" dirty="0"/>
+          </a:p>
+        </p:txBody>
+      </p:sp>
+    </p:spTree>
+    <p:extLst>
+      <p:ext uri="{BB962C8B-B14F-4D97-AF65-F5344CB8AC3E}">
+        <p14:creationId xmlns:p14="http://schemas.microsoft.com/office/powerpoint/2010/main" val="2885867240"/>
+      </p:ext>
+    </p:extLst>
+  </p:cSld>
+  <p:clrMapOvr>
+    <a:masterClrMapping/>
+  </p:clrMapOvr>
+</p:sld>
+</file>
+
+<file path=ppt/slides/slide5.xml><?xml version="1.0" encoding="utf-8"?>
+<p:sld xmlns:a="http://schemas.openxmlformats.org/drawingml/2006/main" xmlns:r="http://schemas.openxmlformats.org/officeDocument/2006/relationships" xmlns:p="http://schemas.openxmlformats.org/presentationml/2006/main">
+  <p:cSld>
+    <p:spTree>
+      <p:nvGrpSpPr>
+        <p:cNvPr id="1" name="">
+          <a:extLst>
+            <a:ext uri="{FF2B5EF4-FFF2-40B4-BE49-F238E27FC236}">
+              <a16:creationId xmlns:a16="http://schemas.microsoft.com/office/drawing/2014/main" id="{1FA7CABA-0B1D-0A69-658E-A71D765DB1D3}"/>
+            </a:ext>
+          </a:extLst>
+        </p:cNvPr>
+        <p:cNvGrpSpPr/>
+        <p:nvPr/>
+      </p:nvGrpSpPr>
+      <p:grpSpPr>
+        <a:xfrm>
+          <a:off x="0" y="0"/>
+          <a:ext cx="0" cy="0"/>
+          <a:chOff x="0" y="0"/>
+          <a:chExt cx="0" cy="0"/>
+        </a:xfrm>
+      </p:grpSpPr>
+      <p:sp>
+        <p:nvSpPr>
+          <p:cNvPr id="2" name="Title 1">
+            <a:extLst>
+              <a:ext uri="{FF2B5EF4-FFF2-40B4-BE49-F238E27FC236}">
+                <a16:creationId xmlns:a16="http://schemas.microsoft.com/office/drawing/2014/main" id="{74B787DA-D3F7-BDC8-78B9-C9486B616A4F}"/>
+              </a:ext>
+            </a:extLst>
+          </p:cNvPr>
+          <p:cNvSpPr>
+            <a:spLocks noGrp="1"/>
+          </p:cNvSpPr>
+          <p:nvPr>
+            <p:ph type="title"/>
+          </p:nvPr>
+        </p:nvSpPr>
+        <p:spPr>
+          <a:xfrm>
+            <a:off x="1322103" y="944170"/>
+            <a:ext cx="8761413" cy="706964"/>
+          </a:xfrm>
+        </p:spPr>
+        <p:txBody>
+          <a:bodyPr/>
+          <a:lstStyle/>
+          <a:p>
+            <a:pPr algn="ctr"/>
+            <a:r>
+              <a:rPr lang="en-US" dirty="0">
+                <a:effectLst>
+                  <a:outerShdw blurRad="38100" dist="38100" dir="2700000" algn="tl">
+                    <a:srgbClr val="000000">
+                      <a:alpha val="43137"/>
+                    </a:srgbClr>
+                  </a:outerShdw>
+                </a:effectLst>
+              </a:rPr>
+              <a:t>During Runtime:</a:t>
+            </a:r>
+            <a:endParaRPr lang="en-IL" dirty="0">
+              <a:effectLst>
+                <a:outerShdw blurRad="38100" dist="38100" dir="2700000" algn="tl">
+                  <a:srgbClr val="000000">
+                    <a:alpha val="43137"/>
+                  </a:srgbClr>
+                </a:outerShdw>
+              </a:effectLst>
+            </a:endParaRPr>
+          </a:p>
+        </p:txBody>
+      </p:sp>
+      <p:sp>
+        <p:nvSpPr>
+          <p:cNvPr id="3" name="Slide Number Placeholder 2">
+            <a:extLst>
+              <a:ext uri="{FF2B5EF4-FFF2-40B4-BE49-F238E27FC236}">
+                <a16:creationId xmlns:a16="http://schemas.microsoft.com/office/drawing/2014/main" id="{E9537D99-649E-3050-CB94-E0A23A599EED}"/>
+              </a:ext>
+            </a:extLst>
+          </p:cNvPr>
+          <p:cNvSpPr>
+            <a:spLocks noGrp="1"/>
+          </p:cNvSpPr>
+          <p:nvPr>
+            <p:ph type="sldNum" sz="quarter" idx="12"/>
+          </p:nvPr>
+        </p:nvSpPr>
+        <p:spPr/>
+        <p:txBody>
+          <a:bodyPr/>
+          <a:lstStyle/>
+          <a:p>
+            <a:fld id="{B3772009-285A-4481-B009-1807655A1149}" type="slidenum">
+              <a:rPr lang="en-IL" smtClean="0"/>
+              <a:t>5</a:t>
+            </a:fld>
+            <a:endParaRPr lang="en-IL"/>
+          </a:p>
+        </p:txBody>
+      </p:sp>
+      <p:sp>
+        <p:nvSpPr>
+          <p:cNvPr id="5" name="Rectangle 4">
+            <a:extLst>
+              <a:ext uri="{FF2B5EF4-FFF2-40B4-BE49-F238E27FC236}">
+                <a16:creationId xmlns:a16="http://schemas.microsoft.com/office/drawing/2014/main" id="{628AE457-0033-DDD2-71B9-D1A19DD130CC}"/>
+              </a:ext>
+            </a:extLst>
+          </p:cNvPr>
+          <p:cNvSpPr/>
+          <p:nvPr/>
+        </p:nvSpPr>
+        <p:spPr>
+          <a:xfrm>
+            <a:off x="847371" y="2360506"/>
+            <a:ext cx="926565" cy="638726"/>
+          </a:xfrm>
+          <a:prstGeom prst="rect">
+            <a:avLst/>
+          </a:prstGeom>
+        </p:spPr>
+        <p:style>
+          <a:lnRef idx="2">
+            <a:schemeClr val="accent6"/>
+          </a:lnRef>
+          <a:fillRef idx="1">
+            <a:schemeClr val="lt1"/>
+          </a:fillRef>
+          <a:effectRef idx="0">
+            <a:schemeClr val="accent6"/>
+          </a:effectRef>
+          <a:fontRef idx="minor">
+            <a:schemeClr val="dk1"/>
+          </a:fontRef>
+        </p:style>
+        <p:txBody>
+          <a:bodyPr rtlCol="0" anchor="ctr"/>
+          <a:lstStyle/>
+          <a:p>
+            <a:pPr algn="ctr"/>
+            <a:r>
+              <a:rPr lang="en-US" sz="1200" dirty="0"/>
+              <a:t>User</a:t>
+            </a:r>
+            <a:endParaRPr lang="en-IL" dirty="0"/>
+          </a:p>
+        </p:txBody>
+      </p:sp>
+      <p:sp>
+        <p:nvSpPr>
+          <p:cNvPr id="7" name="Rectangle 6">
+            <a:extLst>
+              <a:ext uri="{FF2B5EF4-FFF2-40B4-BE49-F238E27FC236}">
+                <a16:creationId xmlns:a16="http://schemas.microsoft.com/office/drawing/2014/main" id="{3E2DA0DD-6B6C-DB65-0399-1C567EC3AD6D}"/>
+              </a:ext>
+            </a:extLst>
+          </p:cNvPr>
+          <p:cNvSpPr/>
+          <p:nvPr/>
+        </p:nvSpPr>
+        <p:spPr>
+          <a:xfrm>
+            <a:off x="4864705" y="3240823"/>
+            <a:ext cx="6766463" cy="2542032"/>
+          </a:xfrm>
+          <a:prstGeom prst="rect">
+            <a:avLst/>
+          </a:prstGeom>
+        </p:spPr>
+        <p:style>
+          <a:lnRef idx="2">
+            <a:schemeClr val="accent6"/>
+          </a:lnRef>
+          <a:fillRef idx="1">
+            <a:schemeClr val="lt1"/>
+          </a:fillRef>
+          <a:effectRef idx="0">
+            <a:schemeClr val="accent6"/>
+          </a:effectRef>
+          <a:fontRef idx="minor">
+            <a:schemeClr val="dk1"/>
+          </a:fontRef>
+        </p:style>
+        <p:txBody>
+          <a:bodyPr rtlCol="0" anchor="ctr"/>
+          <a:lstStyle/>
+          <a:p>
+            <a:endParaRPr lang="en-IL" sz="2400" dirty="0"/>
+          </a:p>
+        </p:txBody>
+      </p:sp>
+      <p:sp>
+        <p:nvSpPr>
+          <p:cNvPr id="10" name="Arrow: Right 9">
+            <a:extLst>
+              <a:ext uri="{FF2B5EF4-FFF2-40B4-BE49-F238E27FC236}">
+                <a16:creationId xmlns:a16="http://schemas.microsoft.com/office/drawing/2014/main" id="{7428158C-ACA3-49CB-B562-86A12E967C4D}"/>
+              </a:ext>
+            </a:extLst>
+          </p:cNvPr>
+          <p:cNvSpPr/>
+          <p:nvPr/>
+        </p:nvSpPr>
+        <p:spPr>
+          <a:xfrm rot="2581385">
+            <a:off x="1329590" y="3247412"/>
+            <a:ext cx="1086499" cy="446359"/>
+          </a:xfrm>
+          <a:prstGeom prst="rightArrow">
+            <a:avLst/>
+          </a:prstGeom>
+          <a:solidFill>
+            <a:schemeClr val="accent1"/>
+          </a:solidFill>
+        </p:spPr>
+        <p:style>
+          <a:lnRef idx="2">
+            <a:schemeClr val="accent1">
+              <a:shade val="15000"/>
+            </a:schemeClr>
+          </a:lnRef>
+          <a:fillRef idx="1">
+            <a:schemeClr val="accent1"/>
+          </a:fillRef>
+          <a:effectRef idx="0">
+            <a:schemeClr val="accent1"/>
+          </a:effectRef>
+          <a:fontRef idx="minor">
+            <a:schemeClr val="lt1"/>
+          </a:fontRef>
+        </p:style>
+        <p:txBody>
+          <a:bodyPr rtlCol="0" anchor="ctr"/>
+          <a:lstStyle/>
+          <a:p>
+            <a:pPr algn="ctr"/>
+            <a:r>
+              <a:rPr lang="en-US" sz="1400" dirty="0"/>
+              <a:t>Query</a:t>
+            </a:r>
+            <a:endParaRPr lang="en-IL" sz="1600" dirty="0"/>
+          </a:p>
+        </p:txBody>
+      </p:sp>
+      <p:sp>
+        <p:nvSpPr>
+          <p:cNvPr id="21" name="Cloud 20">
+            <a:extLst>
+              <a:ext uri="{FF2B5EF4-FFF2-40B4-BE49-F238E27FC236}">
+                <a16:creationId xmlns:a16="http://schemas.microsoft.com/office/drawing/2014/main" id="{D12A43A6-E999-542B-A222-788157F19040}"/>
+              </a:ext>
+            </a:extLst>
+          </p:cNvPr>
+          <p:cNvSpPr/>
+          <p:nvPr/>
+        </p:nvSpPr>
+        <p:spPr>
+          <a:xfrm>
+            <a:off x="2019767" y="3659197"/>
+            <a:ext cx="2096656" cy="1547674"/>
+          </a:xfrm>
+          <a:prstGeom prst="cloud">
+            <a:avLst/>
+          </a:prstGeom>
+        </p:spPr>
+        <p:style>
+          <a:lnRef idx="2">
+            <a:schemeClr val="accent1">
+              <a:shade val="15000"/>
+            </a:schemeClr>
+          </a:lnRef>
+          <a:fillRef idx="1">
+            <a:schemeClr val="accent1"/>
+          </a:fillRef>
+          <a:effectRef idx="0">
+            <a:schemeClr val="accent1"/>
+          </a:effectRef>
+          <a:fontRef idx="minor">
+            <a:schemeClr val="lt1"/>
+          </a:fontRef>
+        </p:style>
+        <p:txBody>
+          <a:bodyPr rtlCol="0" anchor="ctr"/>
+          <a:lstStyle/>
+          <a:p>
+            <a:pPr algn="ctr"/>
+            <a:r>
+              <a:rPr lang="en-US" dirty="0"/>
+              <a:t>GCP</a:t>
+            </a:r>
+            <a:endParaRPr lang="LID4096" dirty="0"/>
+          </a:p>
+        </p:txBody>
+      </p:sp>
+      <p:sp>
+        <p:nvSpPr>
+          <p:cNvPr id="23" name="TextBox 22">
+            <a:extLst>
+              <a:ext uri="{FF2B5EF4-FFF2-40B4-BE49-F238E27FC236}">
+                <a16:creationId xmlns:a16="http://schemas.microsoft.com/office/drawing/2014/main" id="{2061CDD3-D142-CA29-56F4-C1CE6F3A9AEE}"/>
+              </a:ext>
+            </a:extLst>
+          </p:cNvPr>
+          <p:cNvSpPr txBox="1"/>
+          <p:nvPr/>
+        </p:nvSpPr>
+        <p:spPr>
+          <a:xfrm>
+            <a:off x="4728515" y="2896247"/>
+            <a:ext cx="1152475" cy="369332"/>
+          </a:xfrm>
+          <a:prstGeom prst="rect">
+            <a:avLst/>
+          </a:prstGeom>
+          <a:noFill/>
+        </p:spPr>
+        <p:txBody>
+          <a:bodyPr wrap="square" rtlCol="0">
+            <a:spAutoFit/>
+          </a:bodyPr>
+          <a:lstStyle/>
+          <a:p>
+            <a:r>
+              <a:rPr lang="en-US" dirty="0"/>
+              <a:t>Server:</a:t>
+            </a:r>
+            <a:endParaRPr lang="LID4096" dirty="0"/>
+          </a:p>
+        </p:txBody>
+      </p:sp>
+      <p:sp>
+        <p:nvSpPr>
+          <p:cNvPr id="24" name="Rectangle 23">
+            <a:extLst>
+              <a:ext uri="{FF2B5EF4-FFF2-40B4-BE49-F238E27FC236}">
+                <a16:creationId xmlns:a16="http://schemas.microsoft.com/office/drawing/2014/main" id="{5885166D-EBF1-A0F0-6F31-E59DE2C7134F}"/>
+              </a:ext>
+            </a:extLst>
+          </p:cNvPr>
+          <p:cNvSpPr/>
+          <p:nvPr/>
+        </p:nvSpPr>
+        <p:spPr>
+          <a:xfrm>
+            <a:off x="4962520" y="4041100"/>
+            <a:ext cx="956845" cy="847628"/>
+          </a:xfrm>
+          <a:prstGeom prst="rect">
+            <a:avLst/>
+          </a:prstGeom>
+        </p:spPr>
+        <p:style>
+          <a:lnRef idx="2">
+            <a:schemeClr val="accent6"/>
+          </a:lnRef>
+          <a:fillRef idx="1">
+            <a:schemeClr val="lt1"/>
+          </a:fillRef>
+          <a:effectRef idx="0">
+            <a:schemeClr val="accent6"/>
+          </a:effectRef>
+          <a:fontRef idx="minor">
+            <a:schemeClr val="dk1"/>
+          </a:fontRef>
+        </p:style>
+        <p:txBody>
+          <a:bodyPr rtlCol="0" anchor="ctr"/>
+          <a:lstStyle/>
+          <a:p>
+            <a:pPr algn="ctr"/>
+            <a:r>
+              <a:rPr lang="en-US" sz="1200" dirty="0"/>
+              <a:t>Tokenizing and stemming</a:t>
+            </a:r>
+            <a:endParaRPr lang="en-IL" sz="1200" dirty="0"/>
+          </a:p>
+        </p:txBody>
+      </p:sp>
+      <p:sp>
+        <p:nvSpPr>
+          <p:cNvPr id="25" name="Arrow: Right 24">
+            <a:extLst>
+              <a:ext uri="{FF2B5EF4-FFF2-40B4-BE49-F238E27FC236}">
+                <a16:creationId xmlns:a16="http://schemas.microsoft.com/office/drawing/2014/main" id="{DE3B0251-0D42-501D-15E9-3D72E13EEC66}"/>
+              </a:ext>
+            </a:extLst>
+          </p:cNvPr>
+          <p:cNvSpPr/>
+          <p:nvPr/>
+        </p:nvSpPr>
+        <p:spPr>
+          <a:xfrm>
+            <a:off x="6000273" y="4455181"/>
+            <a:ext cx="413393" cy="157611"/>
+          </a:xfrm>
+          <a:prstGeom prst="rightArrow">
+            <a:avLst/>
+          </a:prstGeom>
+          <a:solidFill>
+            <a:schemeClr val="accent1"/>
+          </a:solidFill>
+        </p:spPr>
+        <p:style>
+          <a:lnRef idx="2">
+            <a:schemeClr val="accent1">
+              <a:shade val="15000"/>
+            </a:schemeClr>
+          </a:lnRef>
+          <a:fillRef idx="1">
+            <a:schemeClr val="accent1"/>
+          </a:fillRef>
+          <a:effectRef idx="0">
+            <a:schemeClr val="accent1"/>
+          </a:effectRef>
+          <a:fontRef idx="minor">
+            <a:schemeClr val="lt1"/>
+          </a:fontRef>
+        </p:style>
+        <p:txBody>
+          <a:bodyPr rtlCol="0" anchor="ctr"/>
+          <a:lstStyle/>
+          <a:p>
+            <a:pPr algn="ctr"/>
+            <a:endParaRPr lang="en-IL" sz="1600" dirty="0"/>
+          </a:p>
+        </p:txBody>
+      </p:sp>
+      <p:sp>
+        <p:nvSpPr>
+          <p:cNvPr id="26" name="Rectangle 25">
+            <a:extLst>
+              <a:ext uri="{FF2B5EF4-FFF2-40B4-BE49-F238E27FC236}">
+                <a16:creationId xmlns:a16="http://schemas.microsoft.com/office/drawing/2014/main" id="{2069A179-C54E-345B-7648-538955EEC539}"/>
+              </a:ext>
+            </a:extLst>
+          </p:cNvPr>
+          <p:cNvSpPr/>
+          <p:nvPr/>
+        </p:nvSpPr>
+        <p:spPr>
+          <a:xfrm>
+            <a:off x="6503557" y="3922775"/>
+            <a:ext cx="1300081" cy="1064811"/>
+          </a:xfrm>
+          <a:prstGeom prst="rect">
+            <a:avLst/>
+          </a:prstGeom>
+        </p:spPr>
+        <p:style>
+          <a:lnRef idx="2">
+            <a:schemeClr val="accent6"/>
+          </a:lnRef>
+          <a:fillRef idx="1">
+            <a:schemeClr val="lt1"/>
+          </a:fillRef>
+          <a:effectRef idx="0">
+            <a:schemeClr val="accent6"/>
+          </a:effectRef>
+          <a:fontRef idx="minor">
+            <a:schemeClr val="dk1"/>
+          </a:fontRef>
+        </p:style>
+        <p:txBody>
+          <a:bodyPr rtlCol="0" anchor="ctr"/>
+          <a:lstStyle/>
+          <a:p>
+            <a:pPr algn="ctr"/>
+            <a:r>
+              <a:rPr lang="en-US" sz="1200" dirty="0"/>
+              <a:t>Redistributing weight based on if query is  question or not</a:t>
+            </a:r>
+            <a:endParaRPr lang="en-IL" sz="1200" dirty="0"/>
+          </a:p>
+        </p:txBody>
+      </p:sp>
+      <p:sp>
+        <p:nvSpPr>
+          <p:cNvPr id="27" name="Rectangle 26">
+            <a:extLst>
+              <a:ext uri="{FF2B5EF4-FFF2-40B4-BE49-F238E27FC236}">
+                <a16:creationId xmlns:a16="http://schemas.microsoft.com/office/drawing/2014/main" id="{49357DF4-045A-E815-0656-883D38E62355}"/>
+              </a:ext>
+            </a:extLst>
+          </p:cNvPr>
+          <p:cNvSpPr/>
+          <p:nvPr/>
+        </p:nvSpPr>
+        <p:spPr>
+          <a:xfrm>
+            <a:off x="8817967" y="3922775"/>
+            <a:ext cx="1045362" cy="1064811"/>
+          </a:xfrm>
+          <a:prstGeom prst="rect">
+            <a:avLst/>
+          </a:prstGeom>
+        </p:spPr>
+        <p:style>
+          <a:lnRef idx="2">
+            <a:schemeClr val="accent6"/>
+          </a:lnRef>
+          <a:fillRef idx="1">
+            <a:schemeClr val="lt1"/>
+          </a:fillRef>
+          <a:effectRef idx="0">
+            <a:schemeClr val="accent6"/>
+          </a:effectRef>
+          <a:fontRef idx="minor">
+            <a:schemeClr val="dk1"/>
+          </a:fontRef>
+        </p:style>
+        <p:txBody>
+          <a:bodyPr rtlCol="0" anchor="ctr"/>
+          <a:lstStyle/>
+          <a:p>
+            <a:pPr algn="ctr"/>
+            <a:r>
+              <a:rPr lang="en-US" sz="1200" dirty="0"/>
+              <a:t>Similarity based on BM25 algorithm </a:t>
+            </a:r>
+            <a:endParaRPr lang="en-IL" sz="1200" dirty="0"/>
+          </a:p>
+        </p:txBody>
+      </p:sp>
+      <p:sp>
+        <p:nvSpPr>
+          <p:cNvPr id="28" name="Arrow: Right 27">
+            <a:extLst>
+              <a:ext uri="{FF2B5EF4-FFF2-40B4-BE49-F238E27FC236}">
+                <a16:creationId xmlns:a16="http://schemas.microsoft.com/office/drawing/2014/main" id="{8ECA41C7-8D41-038B-855B-177510AC9DB7}"/>
+              </a:ext>
+            </a:extLst>
+          </p:cNvPr>
+          <p:cNvSpPr/>
+          <p:nvPr/>
+        </p:nvSpPr>
+        <p:spPr>
+          <a:xfrm>
+            <a:off x="7889037" y="4084321"/>
+            <a:ext cx="803859" cy="269908"/>
+          </a:xfrm>
+          <a:prstGeom prst="rightArrow">
+            <a:avLst/>
+          </a:prstGeom>
+          <a:solidFill>
+            <a:schemeClr val="accent1"/>
+          </a:solidFill>
+        </p:spPr>
+        <p:style>
+          <a:lnRef idx="2">
+            <a:schemeClr val="accent1">
+              <a:shade val="15000"/>
+            </a:schemeClr>
+          </a:lnRef>
+          <a:fillRef idx="1">
+            <a:schemeClr val="accent1"/>
+          </a:fillRef>
+          <a:effectRef idx="0">
+            <a:schemeClr val="accent1"/>
+          </a:effectRef>
+          <a:fontRef idx="minor">
+            <a:schemeClr val="lt1"/>
+          </a:fontRef>
+        </p:style>
+        <p:txBody>
+          <a:bodyPr rtlCol="0" anchor="ctr"/>
+          <a:lstStyle/>
+          <a:p>
+            <a:pPr algn="ctr"/>
+            <a:r>
+              <a:rPr lang="en-US" sz="1400" dirty="0"/>
+              <a:t>Title</a:t>
+            </a:r>
+            <a:endParaRPr lang="en-IL" sz="1400" dirty="0"/>
+          </a:p>
+        </p:txBody>
+      </p:sp>
+      <p:sp>
+        <p:nvSpPr>
+          <p:cNvPr id="29" name="Arrow: Right 28">
+            <a:extLst>
+              <a:ext uri="{FF2B5EF4-FFF2-40B4-BE49-F238E27FC236}">
+                <a16:creationId xmlns:a16="http://schemas.microsoft.com/office/drawing/2014/main" id="{41DB932A-4189-ACEB-9C09-E5CF1BB7BC26}"/>
+              </a:ext>
+            </a:extLst>
+          </p:cNvPr>
+          <p:cNvSpPr/>
+          <p:nvPr/>
+        </p:nvSpPr>
+        <p:spPr>
+          <a:xfrm>
+            <a:off x="7889037" y="4455182"/>
+            <a:ext cx="803859" cy="295496"/>
+          </a:xfrm>
+          <a:prstGeom prst="rightArrow">
+            <a:avLst/>
+          </a:prstGeom>
+          <a:solidFill>
+            <a:schemeClr val="accent1"/>
+          </a:solidFill>
+        </p:spPr>
+        <p:style>
+          <a:lnRef idx="2">
+            <a:schemeClr val="accent1">
+              <a:shade val="15000"/>
+            </a:schemeClr>
+          </a:lnRef>
+          <a:fillRef idx="1">
+            <a:schemeClr val="accent1"/>
+          </a:fillRef>
+          <a:effectRef idx="0">
+            <a:schemeClr val="accent1"/>
+          </a:effectRef>
+          <a:fontRef idx="minor">
+            <a:schemeClr val="lt1"/>
+          </a:fontRef>
+        </p:style>
+        <p:txBody>
+          <a:bodyPr rtlCol="0" anchor="ctr"/>
+          <a:lstStyle/>
+          <a:p>
+            <a:pPr algn="ctr"/>
+            <a:r>
+              <a:rPr lang="en-US" sz="1400" dirty="0"/>
+              <a:t>Body</a:t>
+            </a:r>
+            <a:endParaRPr lang="en-IL" sz="1400" dirty="0"/>
+          </a:p>
+        </p:txBody>
+      </p:sp>
+      <p:sp>
+        <p:nvSpPr>
+          <p:cNvPr id="30" name="Rectangle 29">
+            <a:extLst>
+              <a:ext uri="{FF2B5EF4-FFF2-40B4-BE49-F238E27FC236}">
+                <a16:creationId xmlns:a16="http://schemas.microsoft.com/office/drawing/2014/main" id="{9CC986DA-3095-27C7-7A58-71D0E58EADE6}"/>
+              </a:ext>
+            </a:extLst>
+          </p:cNvPr>
+          <p:cNvSpPr/>
+          <p:nvPr/>
+        </p:nvSpPr>
+        <p:spPr>
+          <a:xfrm>
+            <a:off x="10362426" y="3900628"/>
+            <a:ext cx="1045362" cy="1064811"/>
+          </a:xfrm>
+          <a:prstGeom prst="rect">
+            <a:avLst/>
+          </a:prstGeom>
+        </p:spPr>
+        <p:style>
+          <a:lnRef idx="2">
+            <a:schemeClr val="accent6"/>
+          </a:lnRef>
+          <a:fillRef idx="1">
+            <a:schemeClr val="lt1"/>
+          </a:fillRef>
+          <a:effectRef idx="0">
+            <a:schemeClr val="accent6"/>
+          </a:effectRef>
+          <a:fontRef idx="minor">
+            <a:schemeClr val="dk1"/>
+          </a:fontRef>
+        </p:style>
+        <p:txBody>
+          <a:bodyPr rtlCol="0" anchor="ctr"/>
+          <a:lstStyle/>
+          <a:p>
+            <a:pPr algn="ctr"/>
+            <a:r>
+              <a:rPr lang="en-US" sz="1200" dirty="0"/>
+              <a:t>Sorting results and slicing for best 30</a:t>
+            </a:r>
+            <a:endParaRPr lang="en-IL" sz="1200" dirty="0"/>
+          </a:p>
+        </p:txBody>
+      </p:sp>
+      <p:sp>
+        <p:nvSpPr>
+          <p:cNvPr id="31" name="Arrow: Right 30">
+            <a:extLst>
+              <a:ext uri="{FF2B5EF4-FFF2-40B4-BE49-F238E27FC236}">
+                <a16:creationId xmlns:a16="http://schemas.microsoft.com/office/drawing/2014/main" id="{C02EB0D4-4093-DE4B-8B51-353C9C448B87}"/>
+              </a:ext>
+            </a:extLst>
+          </p:cNvPr>
+          <p:cNvSpPr/>
+          <p:nvPr/>
+        </p:nvSpPr>
+        <p:spPr>
+          <a:xfrm>
+            <a:off x="9906181" y="4386108"/>
+            <a:ext cx="413393" cy="157611"/>
+          </a:xfrm>
+          <a:prstGeom prst="rightArrow">
+            <a:avLst/>
+          </a:prstGeom>
+          <a:solidFill>
+            <a:schemeClr val="accent1"/>
+          </a:solidFill>
+        </p:spPr>
+        <p:style>
+          <a:lnRef idx="2">
+            <a:schemeClr val="accent1">
+              <a:shade val="15000"/>
+            </a:schemeClr>
+          </a:lnRef>
+          <a:fillRef idx="1">
+            <a:schemeClr val="accent1"/>
+          </a:fillRef>
+          <a:effectRef idx="0">
+            <a:schemeClr val="accent1"/>
+          </a:effectRef>
+          <a:fontRef idx="minor">
+            <a:schemeClr val="lt1"/>
+          </a:fontRef>
+        </p:style>
+        <p:txBody>
+          <a:bodyPr rtlCol="0" anchor="ctr"/>
+          <a:lstStyle/>
+          <a:p>
+            <a:pPr algn="ctr"/>
+            <a:endParaRPr lang="en-IL" sz="1600" dirty="0"/>
+          </a:p>
+        </p:txBody>
+      </p:sp>
+      <p:sp>
+        <p:nvSpPr>
+          <p:cNvPr id="32" name="Arrow: Right 31">
+            <a:extLst>
+              <a:ext uri="{FF2B5EF4-FFF2-40B4-BE49-F238E27FC236}">
+                <a16:creationId xmlns:a16="http://schemas.microsoft.com/office/drawing/2014/main" id="{F7279E6D-0995-C873-982E-2E39C48A2D6F}"/>
+              </a:ext>
+            </a:extLst>
+          </p:cNvPr>
+          <p:cNvSpPr/>
+          <p:nvPr/>
+        </p:nvSpPr>
+        <p:spPr>
+          <a:xfrm rot="720425" flipH="1">
+            <a:off x="2332312" y="2977617"/>
+            <a:ext cx="2305017" cy="489185"/>
+          </a:xfrm>
+          <a:prstGeom prst="rightArrow">
+            <a:avLst/>
+          </a:prstGeom>
+          <a:solidFill>
+            <a:schemeClr val="accent1"/>
+          </a:solidFill>
+        </p:spPr>
+        <p:style>
+          <a:lnRef idx="2">
+            <a:schemeClr val="accent1">
+              <a:shade val="15000"/>
+            </a:schemeClr>
+          </a:lnRef>
+          <a:fillRef idx="1">
+            <a:schemeClr val="accent1"/>
+          </a:fillRef>
+          <a:effectRef idx="0">
+            <a:schemeClr val="accent1"/>
+          </a:effectRef>
+          <a:fontRef idx="minor">
+            <a:schemeClr val="lt1"/>
+          </a:fontRef>
+        </p:style>
+        <p:txBody>
+          <a:bodyPr rtlCol="0" anchor="ctr"/>
+          <a:lstStyle/>
+          <a:p>
+            <a:pPr algn="ctr"/>
+            <a:r>
+              <a:rPr lang="en-US" sz="1600" dirty="0"/>
+              <a:t>Result as Json</a:t>
+            </a:r>
+            <a:endParaRPr lang="en-IL" sz="1600" dirty="0"/>
+          </a:p>
+        </p:txBody>
+      </p:sp>
+      <p:sp>
+        <p:nvSpPr>
+          <p:cNvPr id="33" name="Arrow: Right 32">
+            <a:extLst>
+              <a:ext uri="{FF2B5EF4-FFF2-40B4-BE49-F238E27FC236}">
+                <a16:creationId xmlns:a16="http://schemas.microsoft.com/office/drawing/2014/main" id="{55F6B24F-2AD9-F947-EDAF-F8D8534FC3EE}"/>
+              </a:ext>
+            </a:extLst>
+          </p:cNvPr>
+          <p:cNvSpPr/>
+          <p:nvPr/>
+        </p:nvSpPr>
+        <p:spPr>
+          <a:xfrm>
+            <a:off x="4201822" y="4275422"/>
+            <a:ext cx="597366" cy="157611"/>
+          </a:xfrm>
+          <a:prstGeom prst="rightArrow">
+            <a:avLst/>
+          </a:prstGeom>
+          <a:solidFill>
+            <a:schemeClr val="accent1"/>
+          </a:solidFill>
+        </p:spPr>
+        <p:style>
+          <a:lnRef idx="2">
+            <a:schemeClr val="accent1">
+              <a:shade val="15000"/>
+            </a:schemeClr>
+          </a:lnRef>
+          <a:fillRef idx="1">
+            <a:schemeClr val="accent1"/>
+          </a:fillRef>
+          <a:effectRef idx="0">
+            <a:schemeClr val="accent1"/>
+          </a:effectRef>
+          <a:fontRef idx="minor">
+            <a:schemeClr val="lt1"/>
+          </a:fontRef>
+        </p:style>
+        <p:txBody>
+          <a:bodyPr rtlCol="0" anchor="ctr"/>
+          <a:lstStyle/>
+          <a:p>
+            <a:pPr algn="ctr"/>
+            <a:endParaRPr lang="en-IL" sz="1600" dirty="0"/>
+          </a:p>
+        </p:txBody>
+      </p:sp>
+    </p:spTree>
+    <p:extLst>
+      <p:ext uri="{BB962C8B-B14F-4D97-AF65-F5344CB8AC3E}">
+        <p14:creationId xmlns:p14="http://schemas.microsoft.com/office/powerpoint/2010/main" val="2652694199"/>
+      </p:ext>
+    </p:extLst>
+  </p:cSld>
+  <p:clrMapOvr>
+    <a:masterClrMapping/>
+  </p:clrMapOvr>
+</p:sld>
+</file>
+
+<file path=ppt/slides/slide6.xml><?xml version="1.0" encoding="utf-8"?>
 <p:sld xmlns:a="http://schemas.openxmlformats.org/drawingml/2006/main" xmlns:r="http://schemas.openxmlformats.org/officeDocument/2006/relationships" xmlns:p="http://schemas.openxmlformats.org/presentationml/2006/main">
   <p:cSld>
     <p:spTree>
@@ -14746,7 +16487,11 @@
           <a:bodyPr rtlCol="0" anchor="ctr"/>
           <a:lstStyle/>
           <a:p>
-            <a:pPr algn="ctr"/>
+            <a:pPr algn="ctr">
+              <a:spcBef>
+                <a:spcPts val="600"/>
+              </a:spcBef>
+            </a:pPr>
             <a:r>
               <a:rPr lang="en-US" sz="1400" dirty="0"/>
               <a:t>Tokenize, </a:t>
@@ -15252,8 +16997,8 @@
           </a:ln>
         </p:spPr>
       </p:pic>
-      <mc:AlternateContent xmlns:mc="http://schemas.openxmlformats.org/markup-compatibility/2006">
-        <mc:Choice xmlns:a14="http://schemas.microsoft.com/office/drawing/2010/main" Requires="a14">
+      <mc:AlternateContent xmlns:mc="http://schemas.openxmlformats.org/markup-compatibility/2006" xmlns:a14="http://schemas.microsoft.com/office/drawing/2010/main">
+        <mc:Choice Requires="a14">
           <p:sp>
             <p:nvSpPr>
               <p:cNvPr id="29" name="Oval 28">
@@ -15343,43 +17088,7 @@
                           <a:ea typeface="Aptos" panose="020B0004020202020204" pitchFamily="34" charset="0"/>
                           <a:cs typeface="Arial" panose="020B0604020202020204" pitchFamily="34" charset="0"/>
                         </a:rPr>
-                        <m:t>: </m:t>
-                      </m:r>
-                      <m:r>
-                        <a:rPr lang="en-US" sz="1200" i="1" kern="100" smtClean="0">
-                          <a:effectLst/>
-                          <a:latin typeface="Cambria Math" panose="02040503050406030204" pitchFamily="18" charset="0"/>
-                          <a:ea typeface="Aptos" panose="020B0004020202020204" pitchFamily="34" charset="0"/>
-                          <a:cs typeface="Arial" panose="020B0604020202020204" pitchFamily="34" charset="0"/>
-                        </a:rPr>
-                        <m:t>3</m:t>
-                      </m:r>
-                      <m:r>
-                        <a:rPr lang="en-US" sz="1200" i="1" kern="100" smtClean="0">
-                          <a:effectLst/>
-                          <a:latin typeface="Cambria Math" panose="02040503050406030204" pitchFamily="18" charset="0"/>
-                          <a:ea typeface="Aptos" panose="020B0004020202020204" pitchFamily="34" charset="0"/>
-                          <a:cs typeface="Arial" panose="020B0604020202020204" pitchFamily="34" charset="0"/>
-                        </a:rPr>
-                        <m:t>.</m:t>
-                      </m:r>
-                      <m:r>
-                        <a:rPr lang="en-US" sz="1200" i="1" kern="100" smtClean="0">
-                          <a:effectLst/>
-                          <a:latin typeface="Cambria Math" panose="02040503050406030204" pitchFamily="18" charset="0"/>
-                          <a:ea typeface="Aptos" panose="020B0004020202020204" pitchFamily="34" charset="0"/>
-                          <a:cs typeface="Arial" panose="020B0604020202020204" pitchFamily="34" charset="0"/>
-                        </a:rPr>
-                        <m:t>1653</m:t>
-                      </m:r>
-                      <m:r>
-                        <a:rPr lang="en-US" sz="1200" i="1" kern="100" smtClean="0">
-                          <a:effectLst/>
-                          <a:latin typeface="Cambria Math" panose="02040503050406030204" pitchFamily="18" charset="0"/>
-                          <a:ea typeface="Aptos" panose="020B0004020202020204" pitchFamily="34" charset="0"/>
-                          <a:cs typeface="Arial" panose="020B0604020202020204" pitchFamily="34" charset="0"/>
-                        </a:rPr>
-                        <m:t> </m:t>
+                        <m:t>: 3.1653 </m:t>
                       </m:r>
                       <m:r>
                         <a:rPr lang="en-US" sz="1200" i="1" kern="100" smtClean="0">
@@ -15451,34 +17160,7 @@
                           <a:ea typeface="Aptos" panose="020B0004020202020204" pitchFamily="34" charset="0"/>
                           <a:cs typeface="Arial" panose="020B0604020202020204" pitchFamily="34" charset="0"/>
                         </a:rPr>
-                        <m:t>: </m:t>
-                      </m:r>
-                      <m:r>
-                        <a:rPr lang="en-US" sz="1200" i="1" kern="100" smtClean="0">
-                          <a:effectLst/>
-                          <a:latin typeface="Cambria Math" panose="02040503050406030204" pitchFamily="18" charset="0"/>
-                          <a:ea typeface="Aptos" panose="020B0004020202020204" pitchFamily="34" charset="0"/>
-                          <a:cs typeface="Arial" panose="020B0604020202020204" pitchFamily="34" charset="0"/>
-                        </a:rPr>
-                        <m:t>0</m:t>
-                      </m:r>
-                      <m:r>
-                        <a:rPr lang="en-US" sz="1200" i="1" kern="100" smtClean="0">
-                          <a:effectLst/>
-                          <a:latin typeface="Cambria Math" panose="02040503050406030204" pitchFamily="18" charset="0"/>
-                          <a:ea typeface="Aptos" panose="020B0004020202020204" pitchFamily="34" charset="0"/>
-                          <a:cs typeface="Arial" panose="020B0604020202020204" pitchFamily="34" charset="0"/>
-                        </a:rPr>
-                        <m:t>.</m:t>
-                      </m:r>
-                      <m:r>
-                        <a:rPr lang="en-US" sz="1200" i="1" kern="100" smtClean="0">
-                          <a:effectLst/>
-                          <a:latin typeface="Cambria Math" panose="02040503050406030204" pitchFamily="18" charset="0"/>
-                          <a:ea typeface="Aptos" panose="020B0004020202020204" pitchFamily="34" charset="0"/>
-                          <a:cs typeface="Arial" panose="020B0604020202020204" pitchFamily="34" charset="0"/>
-                        </a:rPr>
-                        <m:t>2952</m:t>
+                        <m:t>: 0.2952</m:t>
                       </m:r>
                     </m:oMath>
                   </m:oMathPara>
@@ -15497,7 +17179,7 @@
             </p:txBody>
           </p:sp>
         </mc:Choice>
-        <mc:Fallback>
+        <mc:Fallback xmlns="">
           <p:sp>
             <p:nvSpPr>
               <p:cNvPr id="29" name="Oval 28">
@@ -15959,21 +17641,7 @@
                               <a:ea typeface="Aptos" panose="020B0004020202020204" pitchFamily="34" charset="0"/>
                               <a:cs typeface="Times New Roman" panose="02020603050405020304" pitchFamily="18" charset="0"/>
                             </a:rPr>
-                            <m:t>1</m:t>
-                          </m:r>
-                          <m:r>
-                            <a:rPr lang="en-US" sz="1050" i="1" kern="100">
-                              <a:solidFill>
-                                <a:schemeClr val="accent6">
-                                  <a:lumMod val="50000"/>
-                                </a:schemeClr>
-                              </a:solidFill>
-                              <a:effectLst/>
-                              <a:latin typeface="Cambria Math" panose="02040503050406030204" pitchFamily="18" charset="0"/>
-                              <a:ea typeface="Aptos" panose="020B0004020202020204" pitchFamily="34" charset="0"/>
-                              <a:cs typeface="Times New Roman" panose="02020603050405020304" pitchFamily="18" charset="0"/>
-                            </a:rPr>
-                            <m:t>−</m:t>
+                            <m:t>1−</m:t>
                           </m:r>
                           <m:r>
                             <a:rPr lang="en-US" sz="1050" i="1" kern="100">
@@ -16531,7 +18199,7 @@
           <a:p>
             <a:fld id="{B3772009-285A-4481-B009-1807655A1149}" type="slidenum">
               <a:rPr lang="en-IL" smtClean="0"/>
-              <a:t>3</a:t>
+              <a:t>6</a:t>
             </a:fld>
             <a:endParaRPr lang="en-IL"/>
           </a:p>
@@ -16550,7 +18218,7 @@
 </p:sld>
 </file>
 
-<file path=ppt/slides/slide4.xml><?xml version="1.0" encoding="utf-8"?>
+<file path=ppt/slides/slide7.xml><?xml version="1.0" encoding="utf-8"?>
 <p:sld xmlns:a="http://schemas.openxmlformats.org/drawingml/2006/main" xmlns:r="http://schemas.openxmlformats.org/officeDocument/2006/relationships" xmlns:p="http://schemas.openxmlformats.org/presentationml/2006/main">
   <p:cSld>
     <p:spTree>
@@ -16982,8 +18650,8 @@
           </a:fontRef>
         </p:style>
       </p:cxnSp>
-      <mc:AlternateContent xmlns:mc="http://schemas.openxmlformats.org/markup-compatibility/2006">
-        <mc:Choice xmlns:a14="http://schemas.microsoft.com/office/drawing/2010/main" Requires="a14">
+      <mc:AlternateContent xmlns:mc="http://schemas.openxmlformats.org/markup-compatibility/2006" xmlns:a14="http://schemas.microsoft.com/office/drawing/2010/main">
+        <mc:Choice Requires="a14">
           <p:sp>
             <p:nvSpPr>
               <p:cNvPr id="30" name="Rectangle 29">
@@ -17205,7 +18873,7 @@
             </p:txBody>
           </p:sp>
         </mc:Choice>
-        <mc:Fallback>
+        <mc:Fallback xmlns="">
           <p:sp>
             <p:nvSpPr>
               <p:cNvPr id="30" name="Rectangle 29">
@@ -17454,13 +19122,7 @@
                             <a:rPr lang="en-US" sz="1100" i="1">
                               <a:latin typeface="Cambria Math" panose="02040503050406030204" pitchFamily="18" charset="0"/>
                             </a:rPr>
-                            <m:t>=</m:t>
-                          </m:r>
-                          <m:r>
-                            <a:rPr lang="en-US" sz="1100" i="1">
-                              <a:latin typeface="Cambria Math" panose="02040503050406030204" pitchFamily="18" charset="0"/>
-                            </a:rPr>
-                            <m:t>1</m:t>
+                            <m:t>=1</m:t>
                           </m:r>
                         </m:sub>
                         <m:sup>
@@ -17636,13 +19298,7 @@
                                         <a:rPr lang="en-US" sz="1100" i="1">
                                           <a:latin typeface="Cambria Math" panose="02040503050406030204" pitchFamily="18" charset="0"/>
                                         </a:rPr>
-                                        <m:t>+</m:t>
-                                      </m:r>
-                                      <m:r>
-                                        <a:rPr lang="en-US" sz="1100" i="1">
-                                          <a:latin typeface="Cambria Math" panose="02040503050406030204" pitchFamily="18" charset="0"/>
-                                        </a:rPr>
-                                        <m:t>1</m:t>
+                                        <m:t>+1</m:t>
                                       </m:r>
                                     </m:e>
                                   </m:d>
@@ -17761,13 +19417,7 @@
                                             <a:rPr lang="en-US" sz="1100" i="1">
                                               <a:latin typeface="Cambria Math" panose="02040503050406030204" pitchFamily="18" charset="0"/>
                                             </a:rPr>
-                                            <m:t>1</m:t>
-                                          </m:r>
-                                          <m:r>
-                                            <a:rPr lang="en-US" sz="1100" i="1">
-                                              <a:latin typeface="Cambria Math" panose="02040503050406030204" pitchFamily="18" charset="0"/>
-                                            </a:rPr>
-                                            <m:t>−</m:t>
+                                            <m:t>1−</m:t>
                                           </m:r>
                                           <m:r>
                                             <a:rPr lang="en-US" sz="1100" i="1">
@@ -18046,8 +19696,8 @@
           </a:ln>
         </p:spPr>
       </p:pic>
-      <mc:AlternateContent xmlns:mc="http://schemas.openxmlformats.org/markup-compatibility/2006">
-        <mc:Choice xmlns:a14="http://schemas.microsoft.com/office/drawing/2010/main" Requires="a14">
+      <mc:AlternateContent xmlns:mc="http://schemas.openxmlformats.org/markup-compatibility/2006" xmlns:a14="http://schemas.microsoft.com/office/drawing/2010/main">
+        <mc:Choice Requires="a14">
           <p:sp>
             <p:nvSpPr>
               <p:cNvPr id="4" name="Oval 3">
@@ -18133,39 +19783,7 @@
                           <a:ea typeface="Aptos" panose="020B0004020202020204" pitchFamily="34" charset="0"/>
                           <a:cs typeface="Arial" panose="020B0604020202020204" pitchFamily="34" charset="0"/>
                         </a:rPr>
-                        <m:t>:</m:t>
-                      </m:r>
-                      <m:r>
-                        <a:rPr lang="en-US" sz="1200" i="1" kern="100">
-                          <a:latin typeface="Cambria Math" panose="02040503050406030204" pitchFamily="18" charset="0"/>
-                          <a:ea typeface="Aptos" panose="020B0004020202020204" pitchFamily="34" charset="0"/>
-                          <a:cs typeface="Arial" panose="020B0604020202020204" pitchFamily="34" charset="0"/>
-                        </a:rPr>
-                        <m:t>2</m:t>
-                      </m:r>
-                      <m:r>
-                        <a:rPr lang="en-US" sz="1200" i="1" kern="100">
-                          <a:latin typeface="Cambria Math" panose="02040503050406030204" pitchFamily="18" charset="0"/>
-                          <a:ea typeface="Aptos" panose="020B0004020202020204" pitchFamily="34" charset="0"/>
-                          <a:cs typeface="Arial" panose="020B0604020202020204" pitchFamily="34" charset="0"/>
-                        </a:rPr>
-                        <m:t>.</m:t>
-                      </m:r>
-                      <m:r>
-                        <a:rPr lang="en-US" sz="1200" i="1" kern="100">
-                          <a:latin typeface="Cambria Math" panose="02040503050406030204" pitchFamily="18" charset="0"/>
-                          <a:ea typeface="Aptos" panose="020B0004020202020204" pitchFamily="34" charset="0"/>
-                          <a:cs typeface="Arial" panose="020B0604020202020204" pitchFamily="34" charset="0"/>
-                        </a:rPr>
-                        <m:t>8968</m:t>
-                      </m:r>
-                      <m:r>
-                        <a:rPr lang="en-US" sz="1200" i="1" kern="100">
-                          <a:latin typeface="Cambria Math" panose="02040503050406030204" pitchFamily="18" charset="0"/>
-                          <a:ea typeface="Aptos" panose="020B0004020202020204" pitchFamily="34" charset="0"/>
-                          <a:cs typeface="Arial" panose="020B0604020202020204" pitchFamily="34" charset="0"/>
-                        </a:rPr>
-                        <m:t> </m:t>
+                        <m:t>:2.8968 </m:t>
                       </m:r>
                       <m:r>
                         <a:rPr lang="en-US" sz="1200" i="1" kern="100">
@@ -18222,31 +19840,7 @@
                           <a:ea typeface="Aptos" panose="020B0004020202020204" pitchFamily="34" charset="0"/>
                           <a:cs typeface="Arial" panose="020B0604020202020204" pitchFamily="34" charset="0"/>
                         </a:rPr>
-                        <m:t>: </m:t>
-                      </m:r>
-                      <m:r>
-                        <a:rPr lang="en-US" sz="1200" i="1" kern="100">
-                          <a:latin typeface="Cambria Math" panose="02040503050406030204" pitchFamily="18" charset="0"/>
-                          <a:ea typeface="Aptos" panose="020B0004020202020204" pitchFamily="34" charset="0"/>
-                          <a:cs typeface="Arial" panose="020B0604020202020204" pitchFamily="34" charset="0"/>
-                        </a:rPr>
-                        <m:t>0</m:t>
-                      </m:r>
-                      <m:r>
-                        <a:rPr lang="en-US" sz="1200" i="1" kern="100">
-                          <a:latin typeface="Cambria Math" panose="02040503050406030204" pitchFamily="18" charset="0"/>
-                          <a:ea typeface="Aptos" panose="020B0004020202020204" pitchFamily="34" charset="0"/>
-                          <a:cs typeface="Arial" panose="020B0604020202020204" pitchFamily="34" charset="0"/>
-                        </a:rPr>
-                        <m:t>.</m:t>
-                      </m:r>
-                      <m:r>
-                        <a:rPr lang="en-US" sz="1200" i="1" kern="100">
-                          <a:latin typeface="Cambria Math" panose="02040503050406030204" pitchFamily="18" charset="0"/>
-                          <a:ea typeface="Aptos" panose="020B0004020202020204" pitchFamily="34" charset="0"/>
-                          <a:cs typeface="Arial" panose="020B0604020202020204" pitchFamily="34" charset="0"/>
-                        </a:rPr>
-                        <m:t>4205</m:t>
+                        <m:t>: 0.4205</m:t>
                       </m:r>
                     </m:oMath>
                   </m:oMathPara>
@@ -18264,7 +19858,7 @@
             </p:txBody>
           </p:sp>
         </mc:Choice>
-        <mc:Fallback>
+        <mc:Fallback xmlns="">
           <p:sp>
             <p:nvSpPr>
               <p:cNvPr id="4" name="Oval 3">
@@ -18332,7 +19926,7 @@
           <a:p>
             <a:fld id="{B3772009-285A-4481-B009-1807655A1149}" type="slidenum">
               <a:rPr lang="en-IL" smtClean="0"/>
-              <a:t>4</a:t>
+              <a:t>7</a:t>
             </a:fld>
             <a:endParaRPr lang="en-IL"/>
           </a:p>
@@ -18351,7 +19945,7 @@
 </p:sld>
 </file>
 
-<file path=ppt/slides/slide5.xml><?xml version="1.0" encoding="utf-8"?>
+<file path=ppt/slides/slide8.xml><?xml version="1.0" encoding="utf-8"?>
 <p:sld xmlns:a="http://schemas.openxmlformats.org/drawingml/2006/main" xmlns:r="http://schemas.openxmlformats.org/officeDocument/2006/relationships" xmlns:p="http://schemas.openxmlformats.org/presentationml/2006/main">
   <p:cSld>
     <p:bg>
@@ -18937,7 +20531,7 @@
           <a:p>
             <a:fld id="{B3772009-285A-4481-B009-1807655A1149}" type="slidenum">
               <a:rPr lang="en-IL" smtClean="0"/>
-              <a:t>5</a:t>
+              <a:t>8</a:t>
             </a:fld>
             <a:endParaRPr lang="en-IL"/>
           </a:p>

</xml_diff>